<commit_message>
updated PPT slides after brainstorming
</commit_message>
<xml_diff>
--- a/Project1_Final_Presentation_raw_format.pptx
+++ b/Project1_Final_Presentation_raw_format.pptx
@@ -11,17 +11,13 @@
     <p:sldId id="261" r:id="rId5"/>
     <p:sldId id="262" r:id="rId6"/>
     <p:sldId id="263" r:id="rId7"/>
-    <p:sldId id="264" r:id="rId8"/>
-    <p:sldId id="265" r:id="rId9"/>
-    <p:sldId id="266" r:id="rId10"/>
-    <p:sldId id="267" r:id="rId11"/>
-    <p:sldId id="268" r:id="rId12"/>
-    <p:sldId id="269" r:id="rId13"/>
-    <p:sldId id="270" r:id="rId14"/>
-    <p:sldId id="271" r:id="rId15"/>
-    <p:sldId id="272" r:id="rId16"/>
-    <p:sldId id="273" r:id="rId17"/>
-    <p:sldId id="274" r:id="rId18"/>
+    <p:sldId id="275" r:id="rId8"/>
+    <p:sldId id="266" r:id="rId9"/>
+    <p:sldId id="267" r:id="rId10"/>
+    <p:sldId id="271" r:id="rId11"/>
+    <p:sldId id="272" r:id="rId12"/>
+    <p:sldId id="273" r:id="rId13"/>
+    <p:sldId id="274" r:id="rId14"/>
   </p:sldIdLst>
   <p:sldSz cx="12192000" cy="6858000"/>
   <p:notesSz cx="6858000" cy="9144000"/>
@@ -131,6 +127,7 @@
 <file path=ppt/revisionInfo.xml><?xml version="1.0" encoding="utf-8"?>
 <p1510:revInfo xmlns:a="http://schemas.openxmlformats.org/drawingml/2006/main" xmlns:r="http://schemas.openxmlformats.org/officeDocument/2006/relationships" xmlns:p1510="http://schemas.microsoft.com/office/powerpoint/2015/10/main">
   <p1510:revLst>
+    <p1510:client id="{82C85AAC-FD6C-4D08-80CA-4B0996B4C32F}" v="9" dt="2022-08-10T00:58:01.634"/>
     <p1510:client id="{D5FC66FF-937D-4455-91AD-8406D42D21BE}" v="71" dt="2022-08-09T23:59:48.861"/>
   </p1510:revLst>
 </p1510:revInfo>
@@ -138,6 +135,209 @@
 
 <file path=ppt/changesInfos/changesInfo1.xml><?xml version="1.0" encoding="utf-8"?>
 <pc:chgInfo xmlns:a="http://schemas.openxmlformats.org/drawingml/2006/main" xmlns:r="http://schemas.openxmlformats.org/officeDocument/2006/relationships" xmlns:ac="http://schemas.microsoft.com/office/drawing/2013/main/command" xmlns:pc="http://schemas.microsoft.com/office/powerpoint/2013/main/command">
+  <pc:docChgLst>
+    <pc:chgData name="Sunny Bhatt" userId="49e122bafd7cfd0a" providerId="LiveId" clId="{82C85AAC-FD6C-4D08-80CA-4B0996B4C32F}"/>
+    <pc:docChg chg="undo custSel delSld modSld sldOrd">
+      <pc:chgData name="Sunny Bhatt" userId="49e122bafd7cfd0a" providerId="LiveId" clId="{82C85AAC-FD6C-4D08-80CA-4B0996B4C32F}" dt="2022-08-10T00:58:33.742" v="1222" actId="207"/>
+      <pc:docMkLst>
+        <pc:docMk/>
+      </pc:docMkLst>
+      <pc:sldChg chg="modSp mod">
+        <pc:chgData name="Sunny Bhatt" userId="49e122bafd7cfd0a" providerId="LiveId" clId="{82C85AAC-FD6C-4D08-80CA-4B0996B4C32F}" dt="2022-08-10T00:18:09.033" v="2" actId="20577"/>
+        <pc:sldMkLst>
+          <pc:docMk/>
+          <pc:sldMk cId="975043238" sldId="259"/>
+        </pc:sldMkLst>
+        <pc:spChg chg="mod">
+          <ac:chgData name="Sunny Bhatt" userId="49e122bafd7cfd0a" providerId="LiveId" clId="{82C85AAC-FD6C-4D08-80CA-4B0996B4C32F}" dt="2022-08-10T00:18:09.033" v="2" actId="20577"/>
+          <ac:spMkLst>
+            <pc:docMk/>
+            <pc:sldMk cId="975043238" sldId="259"/>
+            <ac:spMk id="5" creationId="{44EF13E3-669E-4BEC-941C-65DA8EF9AE62}"/>
+          </ac:spMkLst>
+        </pc:spChg>
+      </pc:sldChg>
+      <pc:sldChg chg="modSp mod">
+        <pc:chgData name="Sunny Bhatt" userId="49e122bafd7cfd0a" providerId="LiveId" clId="{82C85AAC-FD6C-4D08-80CA-4B0996B4C32F}" dt="2022-08-10T00:27:19.552" v="351" actId="20577"/>
+        <pc:sldMkLst>
+          <pc:docMk/>
+          <pc:sldMk cId="2133866945" sldId="260"/>
+        </pc:sldMkLst>
+        <pc:spChg chg="mod">
+          <ac:chgData name="Sunny Bhatt" userId="49e122bafd7cfd0a" providerId="LiveId" clId="{82C85AAC-FD6C-4D08-80CA-4B0996B4C32F}" dt="2022-08-10T00:20:23.100" v="6" actId="20577"/>
+          <ac:spMkLst>
+            <pc:docMk/>
+            <pc:sldMk cId="2133866945" sldId="260"/>
+            <ac:spMk id="3" creationId="{A7F67253-29DD-4218-AD38-BBA255CE3CC9}"/>
+          </ac:spMkLst>
+        </pc:spChg>
+        <pc:spChg chg="mod">
+          <ac:chgData name="Sunny Bhatt" userId="49e122bafd7cfd0a" providerId="LiveId" clId="{82C85AAC-FD6C-4D08-80CA-4B0996B4C32F}" dt="2022-08-10T00:27:19.552" v="351" actId="20577"/>
+          <ac:spMkLst>
+            <pc:docMk/>
+            <pc:sldMk cId="2133866945" sldId="260"/>
+            <ac:spMk id="4" creationId="{7AEE6AA5-CDBD-4DD9-B318-FF9BCD1A798B}"/>
+          </ac:spMkLst>
+        </pc:spChg>
+      </pc:sldChg>
+      <pc:sldChg chg="modSp mod">
+        <pc:chgData name="Sunny Bhatt" userId="49e122bafd7cfd0a" providerId="LiveId" clId="{82C85AAC-FD6C-4D08-80CA-4B0996B4C32F}" dt="2022-08-10T00:29:06.795" v="365" actId="27636"/>
+        <pc:sldMkLst>
+          <pc:docMk/>
+          <pc:sldMk cId="2418961889" sldId="261"/>
+        </pc:sldMkLst>
+        <pc:spChg chg="mod">
+          <ac:chgData name="Sunny Bhatt" userId="49e122bafd7cfd0a" providerId="LiveId" clId="{82C85AAC-FD6C-4D08-80CA-4B0996B4C32F}" dt="2022-08-10T00:29:06.795" v="365" actId="27636"/>
+          <ac:spMkLst>
+            <pc:docMk/>
+            <pc:sldMk cId="2418961889" sldId="261"/>
+            <ac:spMk id="5" creationId="{40059ABA-2EA0-4C28-BD69-52F4619887DA}"/>
+          </ac:spMkLst>
+        </pc:spChg>
+      </pc:sldChg>
+      <pc:sldChg chg="modSp mod">
+        <pc:chgData name="Sunny Bhatt" userId="49e122bafd7cfd0a" providerId="LiveId" clId="{82C85AAC-FD6C-4D08-80CA-4B0996B4C32F}" dt="2022-08-10T00:29:28.875" v="371" actId="5793"/>
+        <pc:sldMkLst>
+          <pc:docMk/>
+          <pc:sldMk cId="3925844246" sldId="262"/>
+        </pc:sldMkLst>
+        <pc:spChg chg="mod">
+          <ac:chgData name="Sunny Bhatt" userId="49e122bafd7cfd0a" providerId="LiveId" clId="{82C85AAC-FD6C-4D08-80CA-4B0996B4C32F}" dt="2022-08-10T00:29:28.875" v="371" actId="5793"/>
+          <ac:spMkLst>
+            <pc:docMk/>
+            <pc:sldMk cId="3925844246" sldId="262"/>
+            <ac:spMk id="5" creationId="{40059ABA-2EA0-4C28-BD69-52F4619887DA}"/>
+          </ac:spMkLst>
+        </pc:spChg>
+      </pc:sldChg>
+      <pc:sldChg chg="del ord">
+        <pc:chgData name="Sunny Bhatt" userId="49e122bafd7cfd0a" providerId="LiveId" clId="{82C85AAC-FD6C-4D08-80CA-4B0996B4C32F}" dt="2022-08-10T00:50:38.468" v="642" actId="47"/>
+        <pc:sldMkLst>
+          <pc:docMk/>
+          <pc:sldMk cId="3901033085" sldId="264"/>
+        </pc:sldMkLst>
+      </pc:sldChg>
+      <pc:sldChg chg="del ord">
+        <pc:chgData name="Sunny Bhatt" userId="49e122bafd7cfd0a" providerId="LiveId" clId="{82C85AAC-FD6C-4D08-80CA-4B0996B4C32F}" dt="2022-08-10T00:38:45.728" v="424" actId="47"/>
+        <pc:sldMkLst>
+          <pc:docMk/>
+          <pc:sldMk cId="480479742" sldId="265"/>
+        </pc:sldMkLst>
+      </pc:sldChg>
+      <pc:sldChg chg="addSp delSp modSp mod ord">
+        <pc:chgData name="Sunny Bhatt" userId="49e122bafd7cfd0a" providerId="LiveId" clId="{82C85AAC-FD6C-4D08-80CA-4B0996B4C32F}" dt="2022-08-10T00:45:33.354" v="539"/>
+        <pc:sldMkLst>
+          <pc:docMk/>
+          <pc:sldMk cId="1740637987" sldId="266"/>
+        </pc:sldMkLst>
+        <pc:spChg chg="mod">
+          <ac:chgData name="Sunny Bhatt" userId="49e122bafd7cfd0a" providerId="LiveId" clId="{82C85AAC-FD6C-4D08-80CA-4B0996B4C32F}" dt="2022-08-10T00:42:32.484" v="532" actId="20577"/>
+          <ac:spMkLst>
+            <pc:docMk/>
+            <pc:sldMk cId="1740637987" sldId="266"/>
+            <ac:spMk id="2" creationId="{C57E683D-6D95-4A95-A5A2-142683694974}"/>
+          </ac:spMkLst>
+        </pc:spChg>
+        <pc:spChg chg="add del mod">
+          <ac:chgData name="Sunny Bhatt" userId="49e122bafd7cfd0a" providerId="LiveId" clId="{82C85AAC-FD6C-4D08-80CA-4B0996B4C32F}" dt="2022-08-10T00:45:33.354" v="539"/>
+          <ac:spMkLst>
+            <pc:docMk/>
+            <pc:sldMk cId="1740637987" sldId="266"/>
+            <ac:spMk id="3" creationId="{C1A92F61-2939-4F01-9127-66D4CB60945D}"/>
+          </ac:spMkLst>
+        </pc:spChg>
+      </pc:sldChg>
+      <pc:sldChg chg="addSp modSp mod">
+        <pc:chgData name="Sunny Bhatt" userId="49e122bafd7cfd0a" providerId="LiveId" clId="{82C85AAC-FD6C-4D08-80CA-4B0996B4C32F}" dt="2022-08-10T00:46:38.672" v="631" actId="20577"/>
+        <pc:sldMkLst>
+          <pc:docMk/>
+          <pc:sldMk cId="3984128667" sldId="267"/>
+        </pc:sldMkLst>
+        <pc:spChg chg="add mod">
+          <ac:chgData name="Sunny Bhatt" userId="49e122bafd7cfd0a" providerId="LiveId" clId="{82C85AAC-FD6C-4D08-80CA-4B0996B4C32F}" dt="2022-08-10T00:46:38.672" v="631" actId="20577"/>
+          <ac:spMkLst>
+            <pc:docMk/>
+            <pc:sldMk cId="3984128667" sldId="267"/>
+            <ac:spMk id="3" creationId="{56D57CE9-A69E-4C5C-875F-D635DB6B0614}"/>
+          </ac:spMkLst>
+        </pc:spChg>
+      </pc:sldChg>
+      <pc:sldChg chg="del">
+        <pc:chgData name="Sunny Bhatt" userId="49e122bafd7cfd0a" providerId="LiveId" clId="{82C85AAC-FD6C-4D08-80CA-4B0996B4C32F}" dt="2022-08-10T00:50:52.842" v="643" actId="47"/>
+        <pc:sldMkLst>
+          <pc:docMk/>
+          <pc:sldMk cId="945879874" sldId="268"/>
+        </pc:sldMkLst>
+      </pc:sldChg>
+      <pc:sldChg chg="del">
+        <pc:chgData name="Sunny Bhatt" userId="49e122bafd7cfd0a" providerId="LiveId" clId="{82C85AAC-FD6C-4D08-80CA-4B0996B4C32F}" dt="2022-08-10T00:51:02.818" v="644" actId="47"/>
+        <pc:sldMkLst>
+          <pc:docMk/>
+          <pc:sldMk cId="2443899076" sldId="269"/>
+        </pc:sldMkLst>
+      </pc:sldChg>
+      <pc:sldChg chg="del">
+        <pc:chgData name="Sunny Bhatt" userId="49e122bafd7cfd0a" providerId="LiveId" clId="{82C85AAC-FD6C-4D08-80CA-4B0996B4C32F}" dt="2022-08-10T00:51:21.033" v="645" actId="47"/>
+        <pc:sldMkLst>
+          <pc:docMk/>
+          <pc:sldMk cId="748120421" sldId="270"/>
+        </pc:sldMkLst>
+      </pc:sldChg>
+      <pc:sldChg chg="addSp modSp mod">
+        <pc:chgData name="Sunny Bhatt" userId="49e122bafd7cfd0a" providerId="LiveId" clId="{82C85AAC-FD6C-4D08-80CA-4B0996B4C32F}" dt="2022-08-10T00:57:08.024" v="1182" actId="20577"/>
+        <pc:sldMkLst>
+          <pc:docMk/>
+          <pc:sldMk cId="2853317282" sldId="273"/>
+        </pc:sldMkLst>
+        <pc:spChg chg="add mod">
+          <ac:chgData name="Sunny Bhatt" userId="49e122bafd7cfd0a" providerId="LiveId" clId="{82C85AAC-FD6C-4D08-80CA-4B0996B4C32F}" dt="2022-08-10T00:57:08.024" v="1182" actId="20577"/>
+          <ac:spMkLst>
+            <pc:docMk/>
+            <pc:sldMk cId="2853317282" sldId="273"/>
+            <ac:spMk id="3" creationId="{A1408691-2D29-48FC-9163-66B7EFCA7B02}"/>
+          </ac:spMkLst>
+        </pc:spChg>
+      </pc:sldChg>
+      <pc:sldChg chg="addSp delSp modSp mod">
+        <pc:chgData name="Sunny Bhatt" userId="49e122bafd7cfd0a" providerId="LiveId" clId="{82C85AAC-FD6C-4D08-80CA-4B0996B4C32F}" dt="2022-08-10T00:58:33.742" v="1222" actId="207"/>
+        <pc:sldMkLst>
+          <pc:docMk/>
+          <pc:sldMk cId="1925821922" sldId="274"/>
+        </pc:sldMkLst>
+        <pc:spChg chg="add del mod">
+          <ac:chgData name="Sunny Bhatt" userId="49e122bafd7cfd0a" providerId="LiveId" clId="{82C85AAC-FD6C-4D08-80CA-4B0996B4C32F}" dt="2022-08-10T00:57:49.668" v="1185"/>
+          <ac:spMkLst>
+            <pc:docMk/>
+            <pc:sldMk cId="1925821922" sldId="274"/>
+            <ac:spMk id="3" creationId="{A07CF0FB-8290-45EC-90AD-9C802342602E}"/>
+          </ac:spMkLst>
+        </pc:spChg>
+        <pc:spChg chg="add mod">
+          <ac:chgData name="Sunny Bhatt" userId="49e122bafd7cfd0a" providerId="LiveId" clId="{82C85AAC-FD6C-4D08-80CA-4B0996B4C32F}" dt="2022-08-10T00:58:33.742" v="1222" actId="207"/>
+          <ac:spMkLst>
+            <pc:docMk/>
+            <pc:sldMk cId="1925821922" sldId="274"/>
+            <ac:spMk id="4" creationId="{CF24DC96-6121-4C68-85B6-9F814F709221}"/>
+          </ac:spMkLst>
+        </pc:spChg>
+      </pc:sldChg>
+      <pc:sldChg chg="modSp mod">
+        <pc:chgData name="Sunny Bhatt" userId="49e122bafd7cfd0a" providerId="LiveId" clId="{82C85AAC-FD6C-4D08-80CA-4B0996B4C32F}" dt="2022-08-10T00:48:26.368" v="639" actId="20577"/>
+        <pc:sldMkLst>
+          <pc:docMk/>
+          <pc:sldMk cId="484720391" sldId="275"/>
+        </pc:sldMkLst>
+        <pc:spChg chg="mod">
+          <ac:chgData name="Sunny Bhatt" userId="49e122bafd7cfd0a" providerId="LiveId" clId="{82C85AAC-FD6C-4D08-80CA-4B0996B4C32F}" dt="2022-08-10T00:48:26.368" v="639" actId="20577"/>
+          <ac:spMkLst>
+            <pc:docMk/>
+            <pc:sldMk cId="484720391" sldId="275"/>
+            <ac:spMk id="2" creationId="{C57E683D-6D95-4A95-A5A2-142683694974}"/>
+          </ac:spMkLst>
+        </pc:spChg>
+      </pc:sldChg>
+    </pc:docChg>
+  </pc:docChgLst>
   <pc:docChgLst>
     <pc:chgData name="Sunny Bhatt" userId="49e122bafd7cfd0a" providerId="LiveId" clId="{D5FC66FF-937D-4455-91AD-8406D42D21BE}"/>
     <pc:docChg chg="undo custSel addSld delSld modSld sldOrd">
@@ -4317,7 +4517,7 @@
                   <a:schemeClr val="bg1"/>
                 </a:solidFill>
               </a:rPr>
-              <a:t>Water level restrictions</a:t>
+              <a:t>P-Value and Null vs Alternate Hypothesis</a:t>
             </a:r>
           </a:p>
         </p:txBody>
@@ -4325,7 +4525,7 @@
     </p:spTree>
     <p:extLst>
       <p:ext uri="{BB962C8B-B14F-4D97-AF65-F5344CB8AC3E}">
-        <p14:creationId xmlns:p14="http://schemas.microsoft.com/office/powerpoint/2010/main" val="3984128667"/>
+        <p14:creationId xmlns:p14="http://schemas.microsoft.com/office/powerpoint/2010/main" val="2772691215"/>
       </p:ext>
     </p:extLst>
   </p:cSld>
@@ -4406,7 +4606,7 @@
                   <a:schemeClr val="bg1"/>
                 </a:solidFill>
               </a:rPr>
-              <a:t>Temperature versus Water level</a:t>
+              <a:t>Total P-Value data</a:t>
             </a:r>
           </a:p>
         </p:txBody>
@@ -4414,7 +4614,7 @@
     </p:spTree>
     <p:extLst>
       <p:ext uri="{BB962C8B-B14F-4D97-AF65-F5344CB8AC3E}">
-        <p14:creationId xmlns:p14="http://schemas.microsoft.com/office/powerpoint/2010/main" val="945879874"/>
+        <p14:creationId xmlns:p14="http://schemas.microsoft.com/office/powerpoint/2010/main" val="745939402"/>
       </p:ext>
     </p:extLst>
   </p:cSld>
@@ -4495,15 +4695,73 @@
                   <a:schemeClr val="bg1"/>
                 </a:solidFill>
               </a:rPr>
-              <a:t>Humidity vs Water level</a:t>
-            </a:r>
+              <a:t>Limitations</a:t>
+            </a:r>
+          </a:p>
+        </p:txBody>
+      </p:sp>
+      <p:sp>
+        <p:nvSpPr>
+          <p:cNvPr id="3" name="TextBox 2">
+            <a:extLst>
+              <a:ext uri="{FF2B5EF4-FFF2-40B4-BE49-F238E27FC236}">
+                <a16:creationId xmlns:a16="http://schemas.microsoft.com/office/drawing/2014/main" id="{A1408691-2D29-48FC-9163-66B7EFCA7B02}"/>
+              </a:ext>
+            </a:extLst>
+          </p:cNvPr>
+          <p:cNvSpPr txBox="1"/>
+          <p:nvPr/>
+        </p:nvSpPr>
+        <p:spPr>
+          <a:xfrm>
+            <a:off x="327804" y="802257"/>
+            <a:ext cx="11559396" cy="1754326"/>
+          </a:xfrm>
+          <a:prstGeom prst="rect">
+            <a:avLst/>
+          </a:prstGeom>
+          <a:noFill/>
+        </p:spPr>
+        <p:txBody>
+          <a:bodyPr wrap="square" rtlCol="0">
+            <a:spAutoFit/>
+          </a:bodyPr>
+          <a:lstStyle/>
+          <a:p>
+            <a:r>
+              <a:rPr lang="en-US" dirty="0"/>
+              <a:t>At this point we might have an impact based on overall population increase in Bexar County which can directly affect the total usage form J17 well. In addition to that, we were not able to get historical data from SAWS.</a:t>
+            </a:r>
+          </a:p>
+          <a:p>
+            <a:endParaRPr lang="en-US" dirty="0"/>
+          </a:p>
+          <a:p>
+            <a:r>
+              <a:rPr lang="en-US" dirty="0"/>
+              <a:t>We were not able to gather 2020 dataset  for Weather and precipitation historical data. (Nov. 8</a:t>
+            </a:r>
+            <a:r>
+              <a:rPr lang="en-US" baseline="30000" dirty="0"/>
+              <a:t>th)</a:t>
+            </a:r>
+            <a:r>
+              <a:rPr lang="en-US" dirty="0"/>
+              <a:t> </a:t>
+            </a:r>
+          </a:p>
+          <a:p>
+            <a:endParaRPr lang="en-US" dirty="0"/>
+          </a:p>
+          <a:p>
+            <a:endParaRPr lang="en-US" dirty="0"/>
           </a:p>
         </p:txBody>
       </p:sp>
     </p:spTree>
     <p:extLst>
       <p:ext uri="{BB962C8B-B14F-4D97-AF65-F5344CB8AC3E}">
-        <p14:creationId xmlns:p14="http://schemas.microsoft.com/office/powerpoint/2010/main" val="2443899076"/>
+        <p14:creationId xmlns:p14="http://schemas.microsoft.com/office/powerpoint/2010/main" val="2853317282"/>
       </p:ext>
     </p:extLst>
   </p:cSld>
@@ -4584,7 +4842,52 @@
                   <a:schemeClr val="bg1"/>
                 </a:solidFill>
               </a:rPr>
-              <a:t>Precipitation vs Water level</a:t>
+              <a:t>Conclusion</a:t>
+            </a:r>
+          </a:p>
+        </p:txBody>
+      </p:sp>
+      <p:sp>
+        <p:nvSpPr>
+          <p:cNvPr id="4" name="TextBox 3">
+            <a:extLst>
+              <a:ext uri="{FF2B5EF4-FFF2-40B4-BE49-F238E27FC236}">
+                <a16:creationId xmlns:a16="http://schemas.microsoft.com/office/drawing/2014/main" id="{CF24DC96-6121-4C68-85B6-9F814F709221}"/>
+              </a:ext>
+            </a:extLst>
+          </p:cNvPr>
+          <p:cNvSpPr txBox="1"/>
+          <p:nvPr/>
+        </p:nvSpPr>
+        <p:spPr>
+          <a:xfrm>
+            <a:off x="388189" y="802257"/>
+            <a:ext cx="11438626" cy="369332"/>
+          </a:xfrm>
+          <a:prstGeom prst="rect">
+            <a:avLst/>
+          </a:prstGeom>
+          <a:noFill/>
+        </p:spPr>
+        <p:txBody>
+          <a:bodyPr wrap="square" rtlCol="0">
+            <a:spAutoFit/>
+          </a:bodyPr>
+          <a:lstStyle/>
+          <a:p>
+            <a:pPr marL="285750" indent="-285750">
+              <a:buFont typeface="Wingdings" panose="05000000000000000000" pitchFamily="2" charset="2"/>
+              <a:buChar char="Ø"/>
+            </a:pPr>
+            <a:r>
+              <a:rPr lang="en-US" dirty="0">
+                <a:solidFill>
+                  <a:schemeClr val="bg1"/>
+                </a:solidFill>
+                <a:latin typeface="Arial" panose="020B0604020202020204" pitchFamily="34" charset="0"/>
+                <a:cs typeface="Arial" panose="020B0604020202020204" pitchFamily="34" charset="0"/>
+              </a:rPr>
+              <a:t>Based on our analysis…..</a:t>
             </a:r>
           </a:p>
         </p:txBody>
@@ -4592,7 +4895,7 @@
     </p:spTree>
     <p:extLst>
       <p:ext uri="{BB962C8B-B14F-4D97-AF65-F5344CB8AC3E}">
-        <p14:creationId xmlns:p14="http://schemas.microsoft.com/office/powerpoint/2010/main" val="748120421"/>
+        <p14:creationId xmlns:p14="http://schemas.microsoft.com/office/powerpoint/2010/main" val="1925821922"/>
       </p:ext>
     </p:extLst>
   </p:cSld>
@@ -4602,7 +4905,7 @@
 </p:sld>
 </file>
 
-<file path=ppt/slides/slide14.xml><?xml version="1.0" encoding="utf-8"?>
+<file path=ppt/slides/slide2.xml><?xml version="1.0" encoding="utf-8"?>
 <p:sld xmlns:a="http://schemas.openxmlformats.org/drawingml/2006/main" xmlns:r="http://schemas.openxmlformats.org/officeDocument/2006/relationships" xmlns:p="http://schemas.openxmlformats.org/presentationml/2006/main">
   <p:cSld>
     <p:bg>
@@ -4643,28 +4946,60 @@
           <p:cNvPr id="2" name="Title 1">
             <a:extLst>
               <a:ext uri="{FF2B5EF4-FFF2-40B4-BE49-F238E27FC236}">
-                <a16:creationId xmlns:a16="http://schemas.microsoft.com/office/drawing/2014/main" id="{C57E683D-6D95-4A95-A5A2-142683694974}"/>
-              </a:ext>
-            </a:extLst>
-          </p:cNvPr>
-          <p:cNvSpPr>
-            <a:spLocks noGrp="1"/>
+                <a16:creationId xmlns:a16="http://schemas.microsoft.com/office/drawing/2014/main" id="{0DF8E64F-64AB-496E-80FE-373B202347B1}"/>
+              </a:ext>
+            </a:extLst>
+          </p:cNvPr>
+          <p:cNvSpPr txBox="1">
+            <a:spLocks/>
           </p:cNvSpPr>
-          <p:nvPr>
-            <p:ph type="title"/>
-          </p:nvPr>
+          <p:nvPr/>
         </p:nvSpPr>
         <p:spPr>
           <a:xfrm>
-            <a:off x="838200" y="161458"/>
-            <a:ext cx="10515600" cy="558511"/>
+            <a:off x="651848" y="116936"/>
+            <a:ext cx="10520702" cy="939656"/>
           </a:xfrm>
+          <a:prstGeom prst="rect">
+            <a:avLst/>
+          </a:prstGeom>
+          <a:effectLst>
+            <a:glow rad="101600">
+              <a:schemeClr val="accent1">
+                <a:satMod val="175000"/>
+                <a:alpha val="40000"/>
+              </a:schemeClr>
+            </a:glow>
+            <a:outerShdw blurRad="50800" dist="38100" dir="2700000" algn="tl" rotWithShape="0">
+              <a:schemeClr val="tx1">
+                <a:alpha val="40000"/>
+              </a:schemeClr>
+            </a:outerShdw>
+          </a:effectLst>
         </p:spPr>
         <p:txBody>
-          <a:bodyPr>
-            <a:normAutofit fontScale="90000"/>
+          <a:bodyPr vert="horz" lIns="91440" tIns="45720" rIns="91440" bIns="45720" rtlCol="0" anchor="ctr">
+            <a:normAutofit/>
           </a:bodyPr>
-          <a:lstStyle/>
+          <a:lstStyle>
+            <a:lvl1pPr algn="l" defTabSz="914400" rtl="0" eaLnBrk="1" latinLnBrk="0" hangingPunct="1">
+              <a:lnSpc>
+                <a:spcPct val="90000"/>
+              </a:lnSpc>
+              <a:spcBef>
+                <a:spcPct val="0"/>
+              </a:spcBef>
+              <a:buNone/>
+              <a:defRPr sz="4400" kern="1200">
+                <a:solidFill>
+                  <a:schemeClr val="tx1"/>
+                </a:solidFill>
+                <a:latin typeface="+mj-lt"/>
+                <a:ea typeface="+mj-ea"/>
+                <a:cs typeface="+mj-cs"/>
+              </a:defRPr>
+            </a:lvl1pPr>
+          </a:lstStyle>
           <a:p>
             <a:pPr algn="ctr"/>
             <a:r>
@@ -4672,16 +5007,486 @@
                 <a:solidFill>
                   <a:schemeClr val="bg1"/>
                 </a:solidFill>
+                <a:latin typeface="Arial Black" panose="020B0A04020102020204" pitchFamily="34" charset="0"/>
               </a:rPr>
-              <a:t>P-Value and Null vs Alternate Hypothesis</a:t>
-            </a:r>
+              <a:t>Project Information</a:t>
+            </a:r>
+          </a:p>
+        </p:txBody>
+      </p:sp>
+      <p:sp>
+        <p:nvSpPr>
+          <p:cNvPr id="3" name="TextBox 2">
+            <a:extLst>
+              <a:ext uri="{FF2B5EF4-FFF2-40B4-BE49-F238E27FC236}">
+                <a16:creationId xmlns:a16="http://schemas.microsoft.com/office/drawing/2014/main" id="{5512E460-F7E5-4FCE-A008-2B926626C388}"/>
+              </a:ext>
+            </a:extLst>
+          </p:cNvPr>
+          <p:cNvSpPr txBox="1"/>
+          <p:nvPr/>
+        </p:nvSpPr>
+        <p:spPr>
+          <a:xfrm>
+            <a:off x="86263" y="1147312"/>
+            <a:ext cx="7772073" cy="1639019"/>
+          </a:xfrm>
+          <a:prstGeom prst="rect">
+            <a:avLst/>
+          </a:prstGeom>
+          <a:noFill/>
+          <a:effectLst>
+            <a:glow rad="101600">
+              <a:schemeClr val="accent1">
+                <a:satMod val="175000"/>
+                <a:alpha val="40000"/>
+              </a:schemeClr>
+            </a:glow>
+            <a:outerShdw blurRad="50800" dist="38100" dir="2700000" algn="tl" rotWithShape="0">
+              <a:schemeClr val="tx1">
+                <a:alpha val="40000"/>
+              </a:schemeClr>
+            </a:outerShdw>
+          </a:effectLst>
+        </p:spPr>
+        <p:txBody>
+          <a:bodyPr wrap="square" rtlCol="0" anchor="t">
+            <a:noAutofit/>
+          </a:bodyPr>
+          <a:lstStyle/>
+          <a:p>
+            <a:pPr>
+              <a:lnSpc>
+                <a:spcPct val="90000"/>
+              </a:lnSpc>
+              <a:spcAft>
+                <a:spcPts val="600"/>
+              </a:spcAft>
+            </a:pPr>
+            <a:r>
+              <a:rPr lang="en-US" sz="2400" b="1" u="sng" dirty="0">
+                <a:solidFill>
+                  <a:schemeClr val="bg1"/>
+                </a:solidFill>
+                <a:latin typeface="Arial" panose="020B0604020202020204" pitchFamily="34" charset="0"/>
+                <a:cs typeface="Arial" panose="020B0604020202020204" pitchFamily="34" charset="0"/>
+              </a:rPr>
+              <a:t>Project Team (Group 1):</a:t>
+            </a:r>
+          </a:p>
+          <a:p>
+            <a:pPr>
+              <a:lnSpc>
+                <a:spcPct val="90000"/>
+              </a:lnSpc>
+              <a:spcAft>
+                <a:spcPts val="600"/>
+              </a:spcAft>
+            </a:pPr>
+            <a:endParaRPr lang="en-US" sz="2400" dirty="0">
+              <a:solidFill>
+                <a:schemeClr val="bg1"/>
+              </a:solidFill>
+              <a:latin typeface="Arial" panose="020B0604020202020204" pitchFamily="34" charset="0"/>
+              <a:cs typeface="Arial" panose="020B0604020202020204" pitchFamily="34" charset="0"/>
+            </a:endParaRPr>
+          </a:p>
+          <a:p>
+            <a:pPr marL="285750" indent="-285750">
+              <a:lnSpc>
+                <a:spcPct val="90000"/>
+              </a:lnSpc>
+              <a:spcAft>
+                <a:spcPts val="600"/>
+              </a:spcAft>
+              <a:buFont typeface="Calibri" panose="020F0502020204030204" pitchFamily="34" charset="0"/>
+              <a:buChar char="―"/>
+            </a:pPr>
+            <a:r>
+              <a:rPr lang="en-US" sz="2400" dirty="0">
+                <a:solidFill>
+                  <a:schemeClr val="bg1"/>
+                </a:solidFill>
+                <a:latin typeface="Arial" panose="020B0604020202020204" pitchFamily="34" charset="0"/>
+                <a:cs typeface="Arial" panose="020B0604020202020204" pitchFamily="34" charset="0"/>
+              </a:rPr>
+              <a:t>Sierra Quevedo, Jessica </a:t>
+            </a:r>
+            <a:r>
+              <a:rPr lang="en-US" sz="2400" dirty="0" err="1">
+                <a:solidFill>
+                  <a:schemeClr val="bg1"/>
+                </a:solidFill>
+                <a:latin typeface="Arial" panose="020B0604020202020204" pitchFamily="34" charset="0"/>
+                <a:cs typeface="Arial" panose="020B0604020202020204" pitchFamily="34" charset="0"/>
+              </a:rPr>
+              <a:t>Ermovick</a:t>
+            </a:r>
+            <a:r>
+              <a:rPr lang="en-US" sz="2400" dirty="0">
+                <a:solidFill>
+                  <a:schemeClr val="bg1"/>
+                </a:solidFill>
+                <a:latin typeface="Arial" panose="020B0604020202020204" pitchFamily="34" charset="0"/>
+                <a:cs typeface="Arial" panose="020B0604020202020204" pitchFamily="34" charset="0"/>
+              </a:rPr>
+              <a:t>, Matthew Belcher, Gino Hernandez, Shwet ‘Sunny’ Bhatt</a:t>
+            </a:r>
+          </a:p>
+        </p:txBody>
+      </p:sp>
+      <p:sp>
+        <p:nvSpPr>
+          <p:cNvPr id="4" name="TextBox 3">
+            <a:extLst>
+              <a:ext uri="{FF2B5EF4-FFF2-40B4-BE49-F238E27FC236}">
+                <a16:creationId xmlns:a16="http://schemas.microsoft.com/office/drawing/2014/main" id="{11F72D59-10A3-41B4-B118-06F0CE3242FF}"/>
+              </a:ext>
+            </a:extLst>
+          </p:cNvPr>
+          <p:cNvSpPr txBox="1"/>
+          <p:nvPr/>
+        </p:nvSpPr>
+        <p:spPr>
+          <a:xfrm>
+            <a:off x="86263" y="3120416"/>
+            <a:ext cx="7811654" cy="2966347"/>
+          </a:xfrm>
+          <a:prstGeom prst="rect">
+            <a:avLst/>
+          </a:prstGeom>
+          <a:noFill/>
+          <a:effectLst>
+            <a:glow rad="101600">
+              <a:schemeClr val="accent1">
+                <a:satMod val="175000"/>
+                <a:alpha val="40000"/>
+              </a:schemeClr>
+            </a:glow>
+            <a:outerShdw blurRad="50800" dist="38100" dir="2700000" algn="tl" rotWithShape="0">
+              <a:schemeClr val="tx1">
+                <a:alpha val="40000"/>
+              </a:schemeClr>
+            </a:outerShdw>
+          </a:effectLst>
+        </p:spPr>
+        <p:txBody>
+          <a:bodyPr wrap="square" rtlCol="0" anchor="t">
+            <a:normAutofit lnSpcReduction="10000"/>
+          </a:bodyPr>
+          <a:lstStyle/>
+          <a:p>
+            <a:pPr>
+              <a:lnSpc>
+                <a:spcPct val="90000"/>
+              </a:lnSpc>
+              <a:spcAft>
+                <a:spcPts val="600"/>
+              </a:spcAft>
+            </a:pPr>
+            <a:r>
+              <a:rPr lang="en-US" sz="2400" b="1" u="sng" dirty="0">
+                <a:solidFill>
+                  <a:schemeClr val="bg1"/>
+                </a:solidFill>
+                <a:latin typeface="Arial" panose="020B0604020202020204" pitchFamily="34" charset="0"/>
+                <a:cs typeface="Arial" panose="020B0604020202020204" pitchFamily="34" charset="0"/>
+              </a:rPr>
+              <a:t>Project Scope:</a:t>
+            </a:r>
+          </a:p>
+          <a:p>
+            <a:pPr>
+              <a:lnSpc>
+                <a:spcPct val="90000"/>
+              </a:lnSpc>
+              <a:spcAft>
+                <a:spcPts val="600"/>
+              </a:spcAft>
+            </a:pPr>
+            <a:endParaRPr lang="en-US" sz="2400" dirty="0">
+              <a:solidFill>
+                <a:schemeClr val="bg1"/>
+              </a:solidFill>
+              <a:latin typeface="Arial" panose="020B0604020202020204" pitchFamily="34" charset="0"/>
+              <a:cs typeface="Arial" panose="020B0604020202020204" pitchFamily="34" charset="0"/>
+            </a:endParaRPr>
+          </a:p>
+          <a:p>
+            <a:pPr marL="285750" indent="-285750">
+              <a:lnSpc>
+                <a:spcPct val="90000"/>
+              </a:lnSpc>
+              <a:spcAft>
+                <a:spcPts val="600"/>
+              </a:spcAft>
+              <a:buFont typeface="Abadi" panose="020B0604020104020204" pitchFamily="34" charset="0"/>
+              <a:buChar char="–"/>
+            </a:pPr>
+            <a:r>
+              <a:rPr lang="en-US" sz="2400" dirty="0">
+                <a:solidFill>
+                  <a:schemeClr val="bg1"/>
+                </a:solidFill>
+                <a:latin typeface="Arial" panose="020B0604020202020204" pitchFamily="34" charset="0"/>
+                <a:cs typeface="Arial" panose="020B0604020202020204" pitchFamily="34" charset="0"/>
+              </a:rPr>
+              <a:t>As a team we decided to extract historical data from sources such as </a:t>
+            </a:r>
+            <a:r>
+              <a:rPr lang="en-US" sz="2400" dirty="0" err="1">
+                <a:solidFill>
+                  <a:schemeClr val="bg1"/>
+                </a:solidFill>
+                <a:latin typeface="Arial" panose="020B0604020202020204" pitchFamily="34" charset="0"/>
+                <a:cs typeface="Arial" panose="020B0604020202020204" pitchFamily="34" charset="0"/>
+              </a:rPr>
+              <a:t>Wunderground</a:t>
+            </a:r>
+            <a:r>
+              <a:rPr lang="en-US" sz="2400" dirty="0">
+                <a:solidFill>
+                  <a:schemeClr val="bg1"/>
+                </a:solidFill>
+                <a:latin typeface="Arial" panose="020B0604020202020204" pitchFamily="34" charset="0"/>
+                <a:cs typeface="Arial" panose="020B0604020202020204" pitchFamily="34" charset="0"/>
+              </a:rPr>
+              <a:t>, Edwards Aquifer and Drought Monitor to analyze and review the Effectiveness of the San Antonio Water System (SAWS) Water Restrictions Policies implemented for Bexar county. We have used various tools such as…….</a:t>
+            </a:r>
+          </a:p>
+        </p:txBody>
+      </p:sp>
+      <p:sp>
+        <p:nvSpPr>
+          <p:cNvPr id="5" name="TextBox 4">
+            <a:extLst>
+              <a:ext uri="{FF2B5EF4-FFF2-40B4-BE49-F238E27FC236}">
+                <a16:creationId xmlns:a16="http://schemas.microsoft.com/office/drawing/2014/main" id="{44EF13E3-669E-4BEC-941C-65DA8EF9AE62}"/>
+              </a:ext>
+            </a:extLst>
+          </p:cNvPr>
+          <p:cNvSpPr txBox="1"/>
+          <p:nvPr/>
+        </p:nvSpPr>
+        <p:spPr>
+          <a:xfrm>
+            <a:off x="7721600" y="1147312"/>
+            <a:ext cx="4286369" cy="4569997"/>
+          </a:xfrm>
+          <a:prstGeom prst="rect">
+            <a:avLst/>
+          </a:prstGeom>
+          <a:noFill/>
+          <a:effectLst>
+            <a:glow rad="101600">
+              <a:schemeClr val="accent1">
+                <a:satMod val="175000"/>
+                <a:alpha val="40000"/>
+              </a:schemeClr>
+            </a:glow>
+            <a:outerShdw blurRad="50800" dist="38100" dir="2700000" algn="tl" rotWithShape="0">
+              <a:schemeClr val="tx1">
+                <a:alpha val="40000"/>
+              </a:schemeClr>
+            </a:outerShdw>
+          </a:effectLst>
+        </p:spPr>
+        <p:txBody>
+          <a:bodyPr wrap="square" rtlCol="0" anchor="t">
+            <a:normAutofit/>
+          </a:bodyPr>
+          <a:lstStyle/>
+          <a:p>
+            <a:pPr>
+              <a:lnSpc>
+                <a:spcPct val="90000"/>
+              </a:lnSpc>
+              <a:spcAft>
+                <a:spcPts val="600"/>
+              </a:spcAft>
+            </a:pPr>
+            <a:r>
+              <a:rPr lang="en-US" sz="2400" b="1" u="sng" dirty="0">
+                <a:solidFill>
+                  <a:schemeClr val="bg1"/>
+                </a:solidFill>
+                <a:latin typeface="Arial" panose="020B0604020202020204" pitchFamily="34" charset="0"/>
+                <a:cs typeface="Arial" panose="020B0604020202020204" pitchFamily="34" charset="0"/>
+              </a:rPr>
+              <a:t>List of variables analyzed:</a:t>
+            </a:r>
+          </a:p>
+          <a:p>
+            <a:pPr>
+              <a:lnSpc>
+                <a:spcPct val="90000"/>
+              </a:lnSpc>
+              <a:spcAft>
+                <a:spcPts val="600"/>
+              </a:spcAft>
+            </a:pPr>
+            <a:endParaRPr lang="en-US" sz="2400" dirty="0">
+              <a:solidFill>
+                <a:schemeClr val="bg1"/>
+              </a:solidFill>
+              <a:latin typeface="Arial" panose="020B0604020202020204" pitchFamily="34" charset="0"/>
+              <a:cs typeface="Arial" panose="020B0604020202020204" pitchFamily="34" charset="0"/>
+            </a:endParaRPr>
+          </a:p>
+          <a:p>
+            <a:pPr marL="342900" indent="-342900">
+              <a:lnSpc>
+                <a:spcPct val="90000"/>
+              </a:lnSpc>
+              <a:spcAft>
+                <a:spcPts val="600"/>
+              </a:spcAft>
+              <a:buFont typeface="Arial" panose="020B0604020202020204" pitchFamily="34" charset="0"/>
+              <a:buChar char="•"/>
+            </a:pPr>
+            <a:r>
+              <a:rPr lang="en-US" sz="2400" dirty="0">
+                <a:solidFill>
+                  <a:schemeClr val="bg1"/>
+                </a:solidFill>
+                <a:latin typeface="Arial" panose="020B0604020202020204" pitchFamily="34" charset="0"/>
+                <a:cs typeface="Arial" panose="020B0604020202020204" pitchFamily="34" charset="0"/>
+              </a:rPr>
+              <a:t>Water Level (J17)</a:t>
+            </a:r>
+          </a:p>
+          <a:p>
+            <a:pPr marL="342900" indent="-342900">
+              <a:lnSpc>
+                <a:spcPct val="90000"/>
+              </a:lnSpc>
+              <a:spcAft>
+                <a:spcPts val="600"/>
+              </a:spcAft>
+              <a:buFont typeface="Arial" panose="020B0604020202020204" pitchFamily="34" charset="0"/>
+              <a:buChar char="•"/>
+            </a:pPr>
+            <a:r>
+              <a:rPr lang="en-US" sz="2400" dirty="0">
+                <a:solidFill>
+                  <a:schemeClr val="bg1"/>
+                </a:solidFill>
+                <a:latin typeface="Arial" panose="020B0604020202020204" pitchFamily="34" charset="0"/>
+                <a:cs typeface="Arial" panose="020B0604020202020204" pitchFamily="34" charset="0"/>
+              </a:rPr>
+              <a:t>Temperature</a:t>
+            </a:r>
+          </a:p>
+          <a:p>
+            <a:pPr marL="342900" indent="-342900">
+              <a:lnSpc>
+                <a:spcPct val="90000"/>
+              </a:lnSpc>
+              <a:spcAft>
+                <a:spcPts val="600"/>
+              </a:spcAft>
+              <a:buFont typeface="Arial" panose="020B0604020202020204" pitchFamily="34" charset="0"/>
+              <a:buChar char="•"/>
+            </a:pPr>
+            <a:r>
+              <a:rPr lang="en-US" sz="2400" dirty="0">
+                <a:solidFill>
+                  <a:schemeClr val="bg1"/>
+                </a:solidFill>
+                <a:latin typeface="Arial" panose="020B0604020202020204" pitchFamily="34" charset="0"/>
+                <a:cs typeface="Arial" panose="020B0604020202020204" pitchFamily="34" charset="0"/>
+              </a:rPr>
+              <a:t>Humidity and Precipitation</a:t>
+            </a:r>
+          </a:p>
+          <a:p>
+            <a:pPr marL="342900" indent="-342900">
+              <a:lnSpc>
+                <a:spcPct val="90000"/>
+              </a:lnSpc>
+              <a:spcAft>
+                <a:spcPts val="600"/>
+              </a:spcAft>
+              <a:buFont typeface="Arial" panose="020B0604020202020204" pitchFamily="34" charset="0"/>
+              <a:buChar char="•"/>
+            </a:pPr>
+            <a:r>
+              <a:rPr lang="en-US" sz="2400" dirty="0">
+                <a:solidFill>
+                  <a:schemeClr val="bg1"/>
+                </a:solidFill>
+                <a:latin typeface="Arial" panose="020B0604020202020204" pitchFamily="34" charset="0"/>
+                <a:cs typeface="Arial" panose="020B0604020202020204" pitchFamily="34" charset="0"/>
+              </a:rPr>
+              <a:t>Change in Water Level by year (J17)</a:t>
+            </a:r>
+          </a:p>
+          <a:p>
+            <a:pPr marL="342900" indent="-342900">
+              <a:lnSpc>
+                <a:spcPct val="90000"/>
+              </a:lnSpc>
+              <a:spcAft>
+                <a:spcPts val="600"/>
+              </a:spcAft>
+              <a:buFont typeface="Arial" panose="020B0604020202020204" pitchFamily="34" charset="0"/>
+              <a:buChar char="•"/>
+            </a:pPr>
+            <a:r>
+              <a:rPr lang="en-US" sz="2400" dirty="0">
+                <a:solidFill>
+                  <a:schemeClr val="bg1"/>
+                </a:solidFill>
+                <a:latin typeface="Arial" panose="020B0604020202020204" pitchFamily="34" charset="0"/>
+                <a:cs typeface="Arial" panose="020B0604020202020204" pitchFamily="34" charset="0"/>
+              </a:rPr>
+              <a:t>Drought Levels for water restriction (Stage 1, Stage 2, Stage 3)</a:t>
+            </a:r>
+          </a:p>
+          <a:p>
+            <a:pPr marL="342900" indent="-342900">
+              <a:lnSpc>
+                <a:spcPct val="90000"/>
+              </a:lnSpc>
+              <a:spcAft>
+                <a:spcPts val="600"/>
+              </a:spcAft>
+              <a:buFont typeface="Arial" panose="020B0604020202020204" pitchFamily="34" charset="0"/>
+              <a:buChar char="•"/>
+            </a:pPr>
+            <a:endParaRPr lang="en-US" sz="2400" dirty="0">
+              <a:solidFill>
+                <a:schemeClr val="bg1"/>
+              </a:solidFill>
+              <a:latin typeface="Arial" panose="020B0604020202020204" pitchFamily="34" charset="0"/>
+              <a:cs typeface="Arial" panose="020B0604020202020204" pitchFamily="34" charset="0"/>
+            </a:endParaRPr>
+          </a:p>
+          <a:p>
+            <a:pPr marL="342900" indent="-342900">
+              <a:lnSpc>
+                <a:spcPct val="90000"/>
+              </a:lnSpc>
+              <a:spcAft>
+                <a:spcPts val="600"/>
+              </a:spcAft>
+              <a:buFont typeface="Arial" panose="020B0604020202020204" pitchFamily="34" charset="0"/>
+              <a:buChar char="•"/>
+            </a:pPr>
+            <a:endParaRPr lang="en-US" sz="2400" dirty="0">
+              <a:solidFill>
+                <a:schemeClr val="bg1"/>
+              </a:solidFill>
+              <a:latin typeface="Arial" panose="020B0604020202020204" pitchFamily="34" charset="0"/>
+              <a:cs typeface="Arial" panose="020B0604020202020204" pitchFamily="34" charset="0"/>
+            </a:endParaRPr>
           </a:p>
         </p:txBody>
       </p:sp>
     </p:spTree>
     <p:extLst>
       <p:ext uri="{BB962C8B-B14F-4D97-AF65-F5344CB8AC3E}">
-        <p14:creationId xmlns:p14="http://schemas.microsoft.com/office/powerpoint/2010/main" val="2772691215"/>
+        <p14:creationId xmlns:p14="http://schemas.microsoft.com/office/powerpoint/2010/main" val="975043238"/>
       </p:ext>
     </p:extLst>
   </p:cSld>
@@ -4691,7 +5496,7 @@
 </p:sld>
 </file>
 
-<file path=ppt/slides/slide15.xml><?xml version="1.0" encoding="utf-8"?>
+<file path=ppt/slides/slide3.xml><?xml version="1.0" encoding="utf-8"?>
 <p:sld xmlns:a="http://schemas.openxmlformats.org/drawingml/2006/main" xmlns:r="http://schemas.openxmlformats.org/officeDocument/2006/relationships" xmlns:p="http://schemas.openxmlformats.org/presentationml/2006/main">
   <p:cSld>
     <p:bg>
@@ -4762,7 +5567,396 @@
                   <a:schemeClr val="bg1"/>
                 </a:solidFill>
               </a:rPr>
-              <a:t>Total P-Value data</a:t>
+              <a:t>Questions</a:t>
+            </a:r>
+          </a:p>
+        </p:txBody>
+      </p:sp>
+      <p:sp>
+        <p:nvSpPr>
+          <p:cNvPr id="3" name="TextBox 2">
+            <a:extLst>
+              <a:ext uri="{FF2B5EF4-FFF2-40B4-BE49-F238E27FC236}">
+                <a16:creationId xmlns:a16="http://schemas.microsoft.com/office/drawing/2014/main" id="{A7F67253-29DD-4218-AD38-BBA255CE3CC9}"/>
+              </a:ext>
+            </a:extLst>
+          </p:cNvPr>
+          <p:cNvSpPr txBox="1"/>
+          <p:nvPr/>
+        </p:nvSpPr>
+        <p:spPr>
+          <a:xfrm>
+            <a:off x="360218" y="731676"/>
+            <a:ext cx="11831782" cy="2168543"/>
+          </a:xfrm>
+          <a:prstGeom prst="rect">
+            <a:avLst/>
+          </a:prstGeom>
+          <a:noFill/>
+          <a:effectLst>
+            <a:glow rad="101600">
+              <a:schemeClr val="accent1">
+                <a:satMod val="175000"/>
+                <a:alpha val="40000"/>
+              </a:schemeClr>
+            </a:glow>
+            <a:outerShdw blurRad="50800" dist="38100" dir="2700000" algn="tl" rotWithShape="0">
+              <a:schemeClr val="tx1">
+                <a:alpha val="40000"/>
+              </a:schemeClr>
+            </a:outerShdw>
+          </a:effectLst>
+        </p:spPr>
+        <p:txBody>
+          <a:bodyPr wrap="square" rtlCol="0" anchor="t">
+            <a:noAutofit/>
+          </a:bodyPr>
+          <a:lstStyle/>
+          <a:p>
+            <a:pPr>
+              <a:lnSpc>
+                <a:spcPct val="90000"/>
+              </a:lnSpc>
+              <a:spcAft>
+                <a:spcPts val="600"/>
+              </a:spcAft>
+            </a:pPr>
+            <a:r>
+              <a:rPr lang="en-US" b="1" dirty="0">
+                <a:solidFill>
+                  <a:schemeClr val="bg1"/>
+                </a:solidFill>
+                <a:latin typeface="Arial" panose="020B0604020202020204" pitchFamily="34" charset="0"/>
+                <a:cs typeface="Arial" panose="020B0604020202020204" pitchFamily="34" charset="0"/>
+              </a:rPr>
+              <a:t>Which variables help us establish a strong correlation with drop in water levels for well J17?</a:t>
+            </a:r>
+          </a:p>
+          <a:p>
+            <a:pPr>
+              <a:lnSpc>
+                <a:spcPct val="90000"/>
+              </a:lnSpc>
+              <a:spcAft>
+                <a:spcPts val="600"/>
+              </a:spcAft>
+            </a:pPr>
+            <a:endParaRPr lang="en-US" dirty="0">
+              <a:solidFill>
+                <a:schemeClr val="bg1"/>
+              </a:solidFill>
+              <a:latin typeface="Arial" panose="020B0604020202020204" pitchFamily="34" charset="0"/>
+              <a:cs typeface="Arial" panose="020B0604020202020204" pitchFamily="34" charset="0"/>
+            </a:endParaRPr>
+          </a:p>
+          <a:p>
+            <a:pPr marL="285750" indent="-285750">
+              <a:lnSpc>
+                <a:spcPct val="90000"/>
+              </a:lnSpc>
+              <a:spcAft>
+                <a:spcPts val="600"/>
+              </a:spcAft>
+              <a:buFont typeface="Calibri" panose="020F0502020204030204" pitchFamily="34" charset="0"/>
+              <a:buChar char="―"/>
+            </a:pPr>
+            <a:r>
+              <a:rPr lang="en-US" dirty="0">
+                <a:solidFill>
+                  <a:schemeClr val="bg1"/>
+                </a:solidFill>
+                <a:latin typeface="Arial" panose="020B0604020202020204" pitchFamily="34" charset="0"/>
+                <a:cs typeface="Arial" panose="020B0604020202020204" pitchFamily="34" charset="0"/>
+              </a:rPr>
+              <a:t>Did overall consumption of water increase in Bexar county over last 5 years resulting in decrease of water levels?</a:t>
+            </a:r>
+          </a:p>
+          <a:p>
+            <a:pPr marL="285750" indent="-285750">
+              <a:lnSpc>
+                <a:spcPct val="90000"/>
+              </a:lnSpc>
+              <a:spcAft>
+                <a:spcPts val="600"/>
+              </a:spcAft>
+              <a:buFont typeface="Calibri" panose="020F0502020204030204" pitchFamily="34" charset="0"/>
+              <a:buChar char="―"/>
+            </a:pPr>
+            <a:r>
+              <a:rPr lang="en-US" dirty="0">
+                <a:solidFill>
+                  <a:schemeClr val="bg1"/>
+                </a:solidFill>
+                <a:latin typeface="Arial" panose="020B0604020202020204" pitchFamily="34" charset="0"/>
+                <a:cs typeface="Arial" panose="020B0604020202020204" pitchFamily="34" charset="0"/>
+              </a:rPr>
+              <a:t>Did the overall Humidity and precipitation affect water levels?</a:t>
+            </a:r>
+          </a:p>
+          <a:p>
+            <a:pPr marL="285750" indent="-285750">
+              <a:lnSpc>
+                <a:spcPct val="90000"/>
+              </a:lnSpc>
+              <a:spcAft>
+                <a:spcPts val="600"/>
+              </a:spcAft>
+              <a:buFont typeface="Calibri" panose="020F0502020204030204" pitchFamily="34" charset="0"/>
+              <a:buChar char="―"/>
+            </a:pPr>
+            <a:r>
+              <a:rPr lang="en-US" dirty="0">
+                <a:solidFill>
+                  <a:schemeClr val="bg1"/>
+                </a:solidFill>
+                <a:latin typeface="Arial" panose="020B0604020202020204" pitchFamily="34" charset="0"/>
+                <a:cs typeface="Arial" panose="020B0604020202020204" pitchFamily="34" charset="0"/>
+              </a:rPr>
+              <a:t>Did the overall temperature change in last 5 years affect the water levels?</a:t>
+            </a:r>
+          </a:p>
+          <a:p>
+            <a:pPr marL="285750" indent="-285750">
+              <a:lnSpc>
+                <a:spcPct val="90000"/>
+              </a:lnSpc>
+              <a:spcAft>
+                <a:spcPts val="600"/>
+              </a:spcAft>
+              <a:buFont typeface="Calibri" panose="020F0502020204030204" pitchFamily="34" charset="0"/>
+              <a:buChar char="―"/>
+            </a:pPr>
+            <a:r>
+              <a:rPr lang="en-US" dirty="0">
+                <a:solidFill>
+                  <a:schemeClr val="bg1"/>
+                </a:solidFill>
+                <a:latin typeface="Arial" panose="020B0604020202020204" pitchFamily="34" charset="0"/>
+                <a:cs typeface="Arial" panose="020B0604020202020204" pitchFamily="34" charset="0"/>
+              </a:rPr>
+              <a:t>How does San Antonio Water Systems implement drought restrictions. Based on recent data, are current restrictions effective in maintaining and/or replenishing water level in well J17?</a:t>
+            </a:r>
+          </a:p>
+          <a:p>
+            <a:pPr marL="285750" indent="-285750">
+              <a:lnSpc>
+                <a:spcPct val="90000"/>
+              </a:lnSpc>
+              <a:spcAft>
+                <a:spcPts val="600"/>
+              </a:spcAft>
+              <a:buFont typeface="Calibri" panose="020F0502020204030204" pitchFamily="34" charset="0"/>
+              <a:buChar char="―"/>
+            </a:pPr>
+            <a:endParaRPr lang="en-US" dirty="0">
+              <a:solidFill>
+                <a:schemeClr val="bg1"/>
+              </a:solidFill>
+              <a:latin typeface="Arial" panose="020B0604020202020204" pitchFamily="34" charset="0"/>
+              <a:cs typeface="Arial" panose="020B0604020202020204" pitchFamily="34" charset="0"/>
+            </a:endParaRPr>
+          </a:p>
+          <a:p>
+            <a:pPr marL="285750" indent="-285750">
+              <a:lnSpc>
+                <a:spcPct val="90000"/>
+              </a:lnSpc>
+              <a:spcAft>
+                <a:spcPts val="600"/>
+              </a:spcAft>
+              <a:buFont typeface="Calibri" panose="020F0502020204030204" pitchFamily="34" charset="0"/>
+              <a:buChar char="―"/>
+            </a:pPr>
+            <a:endParaRPr lang="en-US" dirty="0">
+              <a:solidFill>
+                <a:schemeClr val="bg1"/>
+              </a:solidFill>
+              <a:latin typeface="Arial" panose="020B0604020202020204" pitchFamily="34" charset="0"/>
+              <a:cs typeface="Arial" panose="020B0604020202020204" pitchFamily="34" charset="0"/>
+            </a:endParaRPr>
+          </a:p>
+          <a:p>
+            <a:pPr marL="285750" indent="-285750">
+              <a:lnSpc>
+                <a:spcPct val="90000"/>
+              </a:lnSpc>
+              <a:spcAft>
+                <a:spcPts val="600"/>
+              </a:spcAft>
+              <a:buFont typeface="Calibri" panose="020F0502020204030204" pitchFamily="34" charset="0"/>
+              <a:buChar char="―"/>
+            </a:pPr>
+            <a:endParaRPr lang="en-US" dirty="0">
+              <a:solidFill>
+                <a:schemeClr val="bg1"/>
+              </a:solidFill>
+              <a:latin typeface="Arial" panose="020B0604020202020204" pitchFamily="34" charset="0"/>
+              <a:cs typeface="Arial" panose="020B0604020202020204" pitchFamily="34" charset="0"/>
+            </a:endParaRPr>
+          </a:p>
+        </p:txBody>
+      </p:sp>
+      <p:sp>
+        <p:nvSpPr>
+          <p:cNvPr id="4" name="TextBox 3">
+            <a:extLst>
+              <a:ext uri="{FF2B5EF4-FFF2-40B4-BE49-F238E27FC236}">
+                <a16:creationId xmlns:a16="http://schemas.microsoft.com/office/drawing/2014/main" id="{7AEE6AA5-CDBD-4DD9-B318-FF9BCD1A798B}"/>
+              </a:ext>
+            </a:extLst>
+          </p:cNvPr>
+          <p:cNvSpPr txBox="1"/>
+          <p:nvPr/>
+        </p:nvSpPr>
+        <p:spPr>
+          <a:xfrm>
+            <a:off x="258619" y="3957781"/>
+            <a:ext cx="11831782" cy="2168543"/>
+          </a:xfrm>
+          <a:prstGeom prst="rect">
+            <a:avLst/>
+          </a:prstGeom>
+          <a:noFill/>
+          <a:effectLst>
+            <a:glow rad="101600">
+              <a:schemeClr val="accent1">
+                <a:satMod val="175000"/>
+                <a:alpha val="40000"/>
+              </a:schemeClr>
+            </a:glow>
+            <a:outerShdw blurRad="50800" dist="38100" dir="2700000" algn="tl" rotWithShape="0">
+              <a:schemeClr val="tx1">
+                <a:alpha val="40000"/>
+              </a:schemeClr>
+            </a:outerShdw>
+          </a:effectLst>
+        </p:spPr>
+        <p:txBody>
+          <a:bodyPr wrap="square" rtlCol="0" anchor="t">
+            <a:noAutofit/>
+          </a:bodyPr>
+          <a:lstStyle/>
+          <a:p>
+            <a:pPr>
+              <a:lnSpc>
+                <a:spcPct val="90000"/>
+              </a:lnSpc>
+              <a:spcAft>
+                <a:spcPts val="600"/>
+              </a:spcAft>
+            </a:pPr>
+            <a:r>
+              <a:rPr lang="en-US" b="1" dirty="0">
+                <a:solidFill>
+                  <a:schemeClr val="bg1"/>
+                </a:solidFill>
+                <a:latin typeface="Arial" panose="020B0604020202020204" pitchFamily="34" charset="0"/>
+                <a:cs typeface="Arial" panose="020B0604020202020204" pitchFamily="34" charset="0"/>
+              </a:rPr>
+              <a:t>How do we look at this issue as a group based on available data?</a:t>
+            </a:r>
+          </a:p>
+          <a:p>
+            <a:pPr>
+              <a:lnSpc>
+                <a:spcPct val="90000"/>
+              </a:lnSpc>
+              <a:spcAft>
+                <a:spcPts val="600"/>
+              </a:spcAft>
+            </a:pPr>
+            <a:endParaRPr lang="en-US" dirty="0">
+              <a:solidFill>
+                <a:schemeClr val="bg1"/>
+              </a:solidFill>
+              <a:latin typeface="Arial" panose="020B0604020202020204" pitchFamily="34" charset="0"/>
+              <a:cs typeface="Arial" panose="020B0604020202020204" pitchFamily="34" charset="0"/>
+            </a:endParaRPr>
+          </a:p>
+          <a:p>
+            <a:pPr marL="285750" indent="-285750">
+              <a:lnSpc>
+                <a:spcPct val="90000"/>
+              </a:lnSpc>
+              <a:spcAft>
+                <a:spcPts val="600"/>
+              </a:spcAft>
+              <a:buFont typeface="Calibri" panose="020F0502020204030204" pitchFamily="34" charset="0"/>
+              <a:buChar char="―"/>
+            </a:pPr>
+            <a:r>
+              <a:rPr lang="en-US" dirty="0">
+                <a:solidFill>
+                  <a:schemeClr val="bg1"/>
+                </a:solidFill>
+                <a:latin typeface="Arial" panose="020B0604020202020204" pitchFamily="34" charset="0"/>
+                <a:cs typeface="Arial" panose="020B0604020202020204" pitchFamily="34" charset="0"/>
+              </a:rPr>
+              <a:t>Graphically we represented our data in scatter plots, line charts, whisker plot. In addition to this we worked on a predictive analysis model that helped us establish if there was any correlation between temperature and J17 water levels.</a:t>
+            </a:r>
+          </a:p>
+          <a:p>
+            <a:pPr marL="285750" indent="-285750">
+              <a:lnSpc>
+                <a:spcPct val="90000"/>
+              </a:lnSpc>
+              <a:spcAft>
+                <a:spcPts val="600"/>
+              </a:spcAft>
+              <a:buFont typeface="Calibri" panose="020F0502020204030204" pitchFamily="34" charset="0"/>
+              <a:buChar char="―"/>
+            </a:pPr>
+            <a:r>
+              <a:rPr lang="en-US" dirty="0">
+                <a:solidFill>
+                  <a:schemeClr val="bg1"/>
+                </a:solidFill>
+                <a:latin typeface="Arial" panose="020B0604020202020204" pitchFamily="34" charset="0"/>
+                <a:cs typeface="Arial" panose="020B0604020202020204" pitchFamily="34" charset="0"/>
+              </a:rPr>
+              <a:t>P-value</a:t>
+            </a:r>
+          </a:p>
+          <a:p>
+            <a:pPr marL="285750" indent="-285750">
+              <a:lnSpc>
+                <a:spcPct val="90000"/>
+              </a:lnSpc>
+              <a:spcAft>
+                <a:spcPts val="600"/>
+              </a:spcAft>
+              <a:buFont typeface="Calibri" panose="020F0502020204030204" pitchFamily="34" charset="0"/>
+              <a:buChar char="―"/>
+            </a:pPr>
+            <a:r>
+              <a:rPr lang="en-US" dirty="0">
+                <a:solidFill>
+                  <a:schemeClr val="bg1"/>
+                </a:solidFill>
+                <a:latin typeface="Arial" panose="020B0604020202020204" pitchFamily="34" charset="0"/>
+                <a:cs typeface="Arial" panose="020B0604020202020204" pitchFamily="34" charset="0"/>
+              </a:rPr>
+              <a:t>We found multiple sources of data and the main challenge was to clean and merge </a:t>
+            </a:r>
+            <a:r>
+              <a:rPr lang="en-US" dirty="0" err="1">
+                <a:solidFill>
+                  <a:schemeClr val="bg1"/>
+                </a:solidFill>
+                <a:latin typeface="Arial" panose="020B0604020202020204" pitchFamily="34" charset="0"/>
+                <a:cs typeface="Arial" panose="020B0604020202020204" pitchFamily="34" charset="0"/>
+              </a:rPr>
+              <a:t>dataframes</a:t>
+            </a:r>
+            <a:r>
+              <a:rPr lang="en-US" dirty="0">
+                <a:solidFill>
+                  <a:schemeClr val="bg1"/>
+                </a:solidFill>
+                <a:latin typeface="Arial" panose="020B0604020202020204" pitchFamily="34" charset="0"/>
+                <a:cs typeface="Arial" panose="020B0604020202020204" pitchFamily="34" charset="0"/>
+              </a:rPr>
+              <a:t>. We had limitations with…….</a:t>
             </a:r>
           </a:p>
         </p:txBody>
@@ -4770,7 +5964,7 @@
     </p:spTree>
     <p:extLst>
       <p:ext uri="{BB962C8B-B14F-4D97-AF65-F5344CB8AC3E}">
-        <p14:creationId xmlns:p14="http://schemas.microsoft.com/office/powerpoint/2010/main" val="745939402"/>
+        <p14:creationId xmlns:p14="http://schemas.microsoft.com/office/powerpoint/2010/main" val="2133866945"/>
       </p:ext>
     </p:extLst>
   </p:cSld>
@@ -4780,7 +5974,7 @@
 </p:sld>
 </file>
 
-<file path=ppt/slides/slide16.xml><?xml version="1.0" encoding="utf-8"?>
+<file path=ppt/slides/slide4.xml><?xml version="1.0" encoding="utf-8"?>
 <p:sld xmlns:a="http://schemas.openxmlformats.org/drawingml/2006/main" xmlns:r="http://schemas.openxmlformats.org/officeDocument/2006/relationships" xmlns:p="http://schemas.openxmlformats.org/presentationml/2006/main">
   <p:cSld>
     <p:bg>
@@ -4851,1215 +6045,6 @@
                   <a:schemeClr val="bg1"/>
                 </a:solidFill>
               </a:rPr>
-              <a:t>Limitations</a:t>
-            </a:r>
-          </a:p>
-        </p:txBody>
-      </p:sp>
-    </p:spTree>
-    <p:extLst>
-      <p:ext uri="{BB962C8B-B14F-4D97-AF65-F5344CB8AC3E}">
-        <p14:creationId xmlns:p14="http://schemas.microsoft.com/office/powerpoint/2010/main" val="2853317282"/>
-      </p:ext>
-    </p:extLst>
-  </p:cSld>
-  <p:clrMapOvr>
-    <a:masterClrMapping/>
-  </p:clrMapOvr>
-</p:sld>
-</file>
-
-<file path=ppt/slides/slide17.xml><?xml version="1.0" encoding="utf-8"?>
-<p:sld xmlns:a="http://schemas.openxmlformats.org/drawingml/2006/main" xmlns:r="http://schemas.openxmlformats.org/officeDocument/2006/relationships" xmlns:p="http://schemas.openxmlformats.org/presentationml/2006/main">
-  <p:cSld>
-    <p:bg>
-      <p:bgPr>
-        <a:blipFill dpi="0" rotWithShape="1">
-          <a:blip r:embed="rId2">
-            <a:lum/>
-            <a:extLst>
-              <a:ext uri="{837473B0-CC2E-450A-ABE3-18F120FF3D39}">
-                <a1611:picAttrSrcUrl xmlns:a1611="http://schemas.microsoft.com/office/drawing/2016/11/main" r:id="rId3"/>
-              </a:ext>
-            </a:extLst>
-          </a:blip>
-          <a:srcRect/>
-          <a:stretch>
-            <a:fillRect t="-21000" b="-21000"/>
-          </a:stretch>
-        </a:blipFill>
-        <a:effectLst/>
-      </p:bgPr>
-    </p:bg>
-    <p:spTree>
-      <p:nvGrpSpPr>
-        <p:cNvPr id="1" name=""/>
-        <p:cNvGrpSpPr/>
-        <p:nvPr/>
-      </p:nvGrpSpPr>
-      <p:grpSpPr>
-        <a:xfrm>
-          <a:off x="0" y="0"/>
-          <a:ext cx="0" cy="0"/>
-          <a:chOff x="0" y="0"/>
-          <a:chExt cx="0" cy="0"/>
-        </a:xfrm>
-      </p:grpSpPr>
-      <p:sp>
-        <p:nvSpPr>
-          <p:cNvPr id="2" name="Title 1">
-            <a:extLst>
-              <a:ext uri="{FF2B5EF4-FFF2-40B4-BE49-F238E27FC236}">
-                <a16:creationId xmlns:a16="http://schemas.microsoft.com/office/drawing/2014/main" id="{C57E683D-6D95-4A95-A5A2-142683694974}"/>
-              </a:ext>
-            </a:extLst>
-          </p:cNvPr>
-          <p:cNvSpPr>
-            <a:spLocks noGrp="1"/>
-          </p:cNvSpPr>
-          <p:nvPr>
-            <p:ph type="title"/>
-          </p:nvPr>
-        </p:nvSpPr>
-        <p:spPr>
-          <a:xfrm>
-            <a:off x="838200" y="161458"/>
-            <a:ext cx="10515600" cy="558511"/>
-          </a:xfrm>
-        </p:spPr>
-        <p:txBody>
-          <a:bodyPr>
-            <a:normAutofit fontScale="90000"/>
-          </a:bodyPr>
-          <a:lstStyle/>
-          <a:p>
-            <a:pPr algn="ctr"/>
-            <a:r>
-              <a:rPr lang="en-US" dirty="0">
-                <a:solidFill>
-                  <a:schemeClr val="bg1"/>
-                </a:solidFill>
-              </a:rPr>
-              <a:t>Conclusion</a:t>
-            </a:r>
-          </a:p>
-        </p:txBody>
-      </p:sp>
-    </p:spTree>
-    <p:extLst>
-      <p:ext uri="{BB962C8B-B14F-4D97-AF65-F5344CB8AC3E}">
-        <p14:creationId xmlns:p14="http://schemas.microsoft.com/office/powerpoint/2010/main" val="1925821922"/>
-      </p:ext>
-    </p:extLst>
-  </p:cSld>
-  <p:clrMapOvr>
-    <a:masterClrMapping/>
-  </p:clrMapOvr>
-</p:sld>
-</file>
-
-<file path=ppt/slides/slide2.xml><?xml version="1.0" encoding="utf-8"?>
-<p:sld xmlns:a="http://schemas.openxmlformats.org/drawingml/2006/main" xmlns:r="http://schemas.openxmlformats.org/officeDocument/2006/relationships" xmlns:p="http://schemas.openxmlformats.org/presentationml/2006/main">
-  <p:cSld>
-    <p:bg>
-      <p:bgPr>
-        <a:blipFill dpi="0" rotWithShape="1">
-          <a:blip r:embed="rId2">
-            <a:lum/>
-            <a:extLst>
-              <a:ext uri="{837473B0-CC2E-450A-ABE3-18F120FF3D39}">
-                <a1611:picAttrSrcUrl xmlns:a1611="http://schemas.microsoft.com/office/drawing/2016/11/main" r:id="rId3"/>
-              </a:ext>
-            </a:extLst>
-          </a:blip>
-          <a:srcRect/>
-          <a:stretch>
-            <a:fillRect t="-21000" b="-21000"/>
-          </a:stretch>
-        </a:blipFill>
-        <a:effectLst/>
-      </p:bgPr>
-    </p:bg>
-    <p:spTree>
-      <p:nvGrpSpPr>
-        <p:cNvPr id="1" name=""/>
-        <p:cNvGrpSpPr/>
-        <p:nvPr/>
-      </p:nvGrpSpPr>
-      <p:grpSpPr>
-        <a:xfrm>
-          <a:off x="0" y="0"/>
-          <a:ext cx="0" cy="0"/>
-          <a:chOff x="0" y="0"/>
-          <a:chExt cx="0" cy="0"/>
-        </a:xfrm>
-      </p:grpSpPr>
-      <p:sp>
-        <p:nvSpPr>
-          <p:cNvPr id="2" name="Title 1">
-            <a:extLst>
-              <a:ext uri="{FF2B5EF4-FFF2-40B4-BE49-F238E27FC236}">
-                <a16:creationId xmlns:a16="http://schemas.microsoft.com/office/drawing/2014/main" id="{0DF8E64F-64AB-496E-80FE-373B202347B1}"/>
-              </a:ext>
-            </a:extLst>
-          </p:cNvPr>
-          <p:cNvSpPr txBox="1">
-            <a:spLocks/>
-          </p:cNvSpPr>
-          <p:nvPr/>
-        </p:nvSpPr>
-        <p:spPr>
-          <a:xfrm>
-            <a:off x="651848" y="116936"/>
-            <a:ext cx="10520702" cy="939656"/>
-          </a:xfrm>
-          <a:prstGeom prst="rect">
-            <a:avLst/>
-          </a:prstGeom>
-          <a:effectLst>
-            <a:glow rad="101600">
-              <a:schemeClr val="accent1">
-                <a:satMod val="175000"/>
-                <a:alpha val="40000"/>
-              </a:schemeClr>
-            </a:glow>
-            <a:outerShdw blurRad="50800" dist="38100" dir="2700000" algn="tl" rotWithShape="0">
-              <a:schemeClr val="tx1">
-                <a:alpha val="40000"/>
-              </a:schemeClr>
-            </a:outerShdw>
-          </a:effectLst>
-        </p:spPr>
-        <p:txBody>
-          <a:bodyPr vert="horz" lIns="91440" tIns="45720" rIns="91440" bIns="45720" rtlCol="0" anchor="ctr">
-            <a:normAutofit/>
-          </a:bodyPr>
-          <a:lstStyle>
-            <a:lvl1pPr algn="l" defTabSz="914400" rtl="0" eaLnBrk="1" latinLnBrk="0" hangingPunct="1">
-              <a:lnSpc>
-                <a:spcPct val="90000"/>
-              </a:lnSpc>
-              <a:spcBef>
-                <a:spcPct val="0"/>
-              </a:spcBef>
-              <a:buNone/>
-              <a:defRPr sz="4400" kern="1200">
-                <a:solidFill>
-                  <a:schemeClr val="tx1"/>
-                </a:solidFill>
-                <a:latin typeface="+mj-lt"/>
-                <a:ea typeface="+mj-ea"/>
-                <a:cs typeface="+mj-cs"/>
-              </a:defRPr>
-            </a:lvl1pPr>
-          </a:lstStyle>
-          <a:p>
-            <a:pPr algn="ctr"/>
-            <a:r>
-              <a:rPr lang="en-US" dirty="0">
-                <a:solidFill>
-                  <a:schemeClr val="bg1"/>
-                </a:solidFill>
-                <a:latin typeface="Arial Black" panose="020B0A04020102020204" pitchFamily="34" charset="0"/>
-              </a:rPr>
-              <a:t>Project Information</a:t>
-            </a:r>
-          </a:p>
-        </p:txBody>
-      </p:sp>
-      <p:sp>
-        <p:nvSpPr>
-          <p:cNvPr id="3" name="TextBox 2">
-            <a:extLst>
-              <a:ext uri="{FF2B5EF4-FFF2-40B4-BE49-F238E27FC236}">
-                <a16:creationId xmlns:a16="http://schemas.microsoft.com/office/drawing/2014/main" id="{5512E460-F7E5-4FCE-A008-2B926626C388}"/>
-              </a:ext>
-            </a:extLst>
-          </p:cNvPr>
-          <p:cNvSpPr txBox="1"/>
-          <p:nvPr/>
-        </p:nvSpPr>
-        <p:spPr>
-          <a:xfrm>
-            <a:off x="86263" y="1147312"/>
-            <a:ext cx="7772073" cy="1639019"/>
-          </a:xfrm>
-          <a:prstGeom prst="rect">
-            <a:avLst/>
-          </a:prstGeom>
-          <a:noFill/>
-          <a:effectLst>
-            <a:glow rad="101600">
-              <a:schemeClr val="accent1">
-                <a:satMod val="175000"/>
-                <a:alpha val="40000"/>
-              </a:schemeClr>
-            </a:glow>
-            <a:outerShdw blurRad="50800" dist="38100" dir="2700000" algn="tl" rotWithShape="0">
-              <a:schemeClr val="tx1">
-                <a:alpha val="40000"/>
-              </a:schemeClr>
-            </a:outerShdw>
-          </a:effectLst>
-        </p:spPr>
-        <p:txBody>
-          <a:bodyPr wrap="square" rtlCol="0" anchor="t">
-            <a:noAutofit/>
-          </a:bodyPr>
-          <a:lstStyle/>
-          <a:p>
-            <a:pPr>
-              <a:lnSpc>
-                <a:spcPct val="90000"/>
-              </a:lnSpc>
-              <a:spcAft>
-                <a:spcPts val="600"/>
-              </a:spcAft>
-            </a:pPr>
-            <a:r>
-              <a:rPr lang="en-US" sz="2400" b="1" u="sng" dirty="0">
-                <a:solidFill>
-                  <a:schemeClr val="bg1"/>
-                </a:solidFill>
-                <a:latin typeface="Arial" panose="020B0604020202020204" pitchFamily="34" charset="0"/>
-                <a:cs typeface="Arial" panose="020B0604020202020204" pitchFamily="34" charset="0"/>
-              </a:rPr>
-              <a:t>Project Team (Group 1):</a:t>
-            </a:r>
-          </a:p>
-          <a:p>
-            <a:pPr>
-              <a:lnSpc>
-                <a:spcPct val="90000"/>
-              </a:lnSpc>
-              <a:spcAft>
-                <a:spcPts val="600"/>
-              </a:spcAft>
-            </a:pPr>
-            <a:endParaRPr lang="en-US" sz="2400" dirty="0">
-              <a:solidFill>
-                <a:schemeClr val="bg1"/>
-              </a:solidFill>
-              <a:latin typeface="Arial" panose="020B0604020202020204" pitchFamily="34" charset="0"/>
-              <a:cs typeface="Arial" panose="020B0604020202020204" pitchFamily="34" charset="0"/>
-            </a:endParaRPr>
-          </a:p>
-          <a:p>
-            <a:pPr marL="285750" indent="-285750">
-              <a:lnSpc>
-                <a:spcPct val="90000"/>
-              </a:lnSpc>
-              <a:spcAft>
-                <a:spcPts val="600"/>
-              </a:spcAft>
-              <a:buFont typeface="Calibri" panose="020F0502020204030204" pitchFamily="34" charset="0"/>
-              <a:buChar char="―"/>
-            </a:pPr>
-            <a:r>
-              <a:rPr lang="en-US" sz="2400" dirty="0">
-                <a:solidFill>
-                  <a:schemeClr val="bg1"/>
-                </a:solidFill>
-                <a:latin typeface="Arial" panose="020B0604020202020204" pitchFamily="34" charset="0"/>
-                <a:cs typeface="Arial" panose="020B0604020202020204" pitchFamily="34" charset="0"/>
-              </a:rPr>
-              <a:t>Sierra Quevedo, Jessica </a:t>
-            </a:r>
-            <a:r>
-              <a:rPr lang="en-US" sz="2400" dirty="0" err="1">
-                <a:solidFill>
-                  <a:schemeClr val="bg1"/>
-                </a:solidFill>
-                <a:latin typeface="Arial" panose="020B0604020202020204" pitchFamily="34" charset="0"/>
-                <a:cs typeface="Arial" panose="020B0604020202020204" pitchFamily="34" charset="0"/>
-              </a:rPr>
-              <a:t>Ermovick</a:t>
-            </a:r>
-            <a:r>
-              <a:rPr lang="en-US" sz="2400" dirty="0">
-                <a:solidFill>
-                  <a:schemeClr val="bg1"/>
-                </a:solidFill>
-                <a:latin typeface="Arial" panose="020B0604020202020204" pitchFamily="34" charset="0"/>
-                <a:cs typeface="Arial" panose="020B0604020202020204" pitchFamily="34" charset="0"/>
-              </a:rPr>
-              <a:t>, Matthew Belcher, Gino Hernandez, Shwet ‘Sunny’ Bhatt</a:t>
-            </a:r>
-          </a:p>
-        </p:txBody>
-      </p:sp>
-      <p:sp>
-        <p:nvSpPr>
-          <p:cNvPr id="4" name="TextBox 3">
-            <a:extLst>
-              <a:ext uri="{FF2B5EF4-FFF2-40B4-BE49-F238E27FC236}">
-                <a16:creationId xmlns:a16="http://schemas.microsoft.com/office/drawing/2014/main" id="{11F72D59-10A3-41B4-B118-06F0CE3242FF}"/>
-              </a:ext>
-            </a:extLst>
-          </p:cNvPr>
-          <p:cNvSpPr txBox="1"/>
-          <p:nvPr/>
-        </p:nvSpPr>
-        <p:spPr>
-          <a:xfrm>
-            <a:off x="86263" y="3120416"/>
-            <a:ext cx="7811654" cy="2966347"/>
-          </a:xfrm>
-          <a:prstGeom prst="rect">
-            <a:avLst/>
-          </a:prstGeom>
-          <a:noFill/>
-          <a:effectLst>
-            <a:glow rad="101600">
-              <a:schemeClr val="accent1">
-                <a:satMod val="175000"/>
-                <a:alpha val="40000"/>
-              </a:schemeClr>
-            </a:glow>
-            <a:outerShdw blurRad="50800" dist="38100" dir="2700000" algn="tl" rotWithShape="0">
-              <a:schemeClr val="tx1">
-                <a:alpha val="40000"/>
-              </a:schemeClr>
-            </a:outerShdw>
-          </a:effectLst>
-        </p:spPr>
-        <p:txBody>
-          <a:bodyPr wrap="square" rtlCol="0" anchor="t">
-            <a:normAutofit lnSpcReduction="10000"/>
-          </a:bodyPr>
-          <a:lstStyle/>
-          <a:p>
-            <a:pPr>
-              <a:lnSpc>
-                <a:spcPct val="90000"/>
-              </a:lnSpc>
-              <a:spcAft>
-                <a:spcPts val="600"/>
-              </a:spcAft>
-            </a:pPr>
-            <a:r>
-              <a:rPr lang="en-US" sz="2400" b="1" u="sng" dirty="0">
-                <a:solidFill>
-                  <a:schemeClr val="bg1"/>
-                </a:solidFill>
-                <a:latin typeface="Arial" panose="020B0604020202020204" pitchFamily="34" charset="0"/>
-                <a:cs typeface="Arial" panose="020B0604020202020204" pitchFamily="34" charset="0"/>
-              </a:rPr>
-              <a:t>Project Scope:</a:t>
-            </a:r>
-          </a:p>
-          <a:p>
-            <a:pPr>
-              <a:lnSpc>
-                <a:spcPct val="90000"/>
-              </a:lnSpc>
-              <a:spcAft>
-                <a:spcPts val="600"/>
-              </a:spcAft>
-            </a:pPr>
-            <a:endParaRPr lang="en-US" sz="2400" dirty="0">
-              <a:solidFill>
-                <a:schemeClr val="bg1"/>
-              </a:solidFill>
-              <a:latin typeface="Arial" panose="020B0604020202020204" pitchFamily="34" charset="0"/>
-              <a:cs typeface="Arial" panose="020B0604020202020204" pitchFamily="34" charset="0"/>
-            </a:endParaRPr>
-          </a:p>
-          <a:p>
-            <a:pPr marL="285750" indent="-285750">
-              <a:lnSpc>
-                <a:spcPct val="90000"/>
-              </a:lnSpc>
-              <a:spcAft>
-                <a:spcPts val="600"/>
-              </a:spcAft>
-              <a:buFont typeface="Abadi" panose="020B0604020104020204" pitchFamily="34" charset="0"/>
-              <a:buChar char="–"/>
-            </a:pPr>
-            <a:r>
-              <a:rPr lang="en-US" sz="2400" dirty="0">
-                <a:solidFill>
-                  <a:schemeClr val="bg1"/>
-                </a:solidFill>
-                <a:latin typeface="Arial" panose="020B0604020202020204" pitchFamily="34" charset="0"/>
-                <a:cs typeface="Arial" panose="020B0604020202020204" pitchFamily="34" charset="0"/>
-              </a:rPr>
-              <a:t>As a team we decided to extract historical data from sources such as </a:t>
-            </a:r>
-            <a:r>
-              <a:rPr lang="en-US" sz="2400" dirty="0" err="1">
-                <a:solidFill>
-                  <a:schemeClr val="bg1"/>
-                </a:solidFill>
-                <a:latin typeface="Arial" panose="020B0604020202020204" pitchFamily="34" charset="0"/>
-                <a:cs typeface="Arial" panose="020B0604020202020204" pitchFamily="34" charset="0"/>
-              </a:rPr>
-              <a:t>Wunderground</a:t>
-            </a:r>
-            <a:r>
-              <a:rPr lang="en-US" sz="2400" dirty="0">
-                <a:solidFill>
-                  <a:schemeClr val="bg1"/>
-                </a:solidFill>
-                <a:latin typeface="Arial" panose="020B0604020202020204" pitchFamily="34" charset="0"/>
-                <a:cs typeface="Arial" panose="020B0604020202020204" pitchFamily="34" charset="0"/>
-              </a:rPr>
-              <a:t>, Edwards Aquifer and Drought Monitor to analyze and review the Effectiveness of the San Antonio Water System (SAWS) Water Restrictions Policies implemented for Bexar county. We have used various tools such as…….</a:t>
-            </a:r>
-          </a:p>
-        </p:txBody>
-      </p:sp>
-      <p:sp>
-        <p:nvSpPr>
-          <p:cNvPr id="5" name="TextBox 4">
-            <a:extLst>
-              <a:ext uri="{FF2B5EF4-FFF2-40B4-BE49-F238E27FC236}">
-                <a16:creationId xmlns:a16="http://schemas.microsoft.com/office/drawing/2014/main" id="{44EF13E3-669E-4BEC-941C-65DA8EF9AE62}"/>
-              </a:ext>
-            </a:extLst>
-          </p:cNvPr>
-          <p:cNvSpPr txBox="1"/>
-          <p:nvPr/>
-        </p:nvSpPr>
-        <p:spPr>
-          <a:xfrm>
-            <a:off x="7721600" y="1147312"/>
-            <a:ext cx="4286369" cy="4569997"/>
-          </a:xfrm>
-          <a:prstGeom prst="rect">
-            <a:avLst/>
-          </a:prstGeom>
-          <a:noFill/>
-          <a:effectLst>
-            <a:glow rad="101600">
-              <a:schemeClr val="accent1">
-                <a:satMod val="175000"/>
-                <a:alpha val="40000"/>
-              </a:schemeClr>
-            </a:glow>
-            <a:outerShdw blurRad="50800" dist="38100" dir="2700000" algn="tl" rotWithShape="0">
-              <a:schemeClr val="tx1">
-                <a:alpha val="40000"/>
-              </a:schemeClr>
-            </a:outerShdw>
-          </a:effectLst>
-        </p:spPr>
-        <p:txBody>
-          <a:bodyPr wrap="square" rtlCol="0" anchor="t">
-            <a:normAutofit/>
-          </a:bodyPr>
-          <a:lstStyle/>
-          <a:p>
-            <a:pPr>
-              <a:lnSpc>
-                <a:spcPct val="90000"/>
-              </a:lnSpc>
-              <a:spcAft>
-                <a:spcPts val="600"/>
-              </a:spcAft>
-            </a:pPr>
-            <a:r>
-              <a:rPr lang="en-US" sz="2400" b="1" u="sng" dirty="0">
-                <a:solidFill>
-                  <a:schemeClr val="bg1"/>
-                </a:solidFill>
-                <a:latin typeface="Arial" panose="020B0604020202020204" pitchFamily="34" charset="0"/>
-                <a:cs typeface="Arial" panose="020B0604020202020204" pitchFamily="34" charset="0"/>
-              </a:rPr>
-              <a:t>List of variables analyzed:</a:t>
-            </a:r>
-          </a:p>
-          <a:p>
-            <a:pPr>
-              <a:lnSpc>
-                <a:spcPct val="90000"/>
-              </a:lnSpc>
-              <a:spcAft>
-                <a:spcPts val="600"/>
-              </a:spcAft>
-            </a:pPr>
-            <a:endParaRPr lang="en-US" sz="2400" dirty="0">
-              <a:solidFill>
-                <a:schemeClr val="bg1"/>
-              </a:solidFill>
-              <a:latin typeface="Arial" panose="020B0604020202020204" pitchFamily="34" charset="0"/>
-              <a:cs typeface="Arial" panose="020B0604020202020204" pitchFamily="34" charset="0"/>
-            </a:endParaRPr>
-          </a:p>
-          <a:p>
-            <a:pPr marL="342900" indent="-342900">
-              <a:lnSpc>
-                <a:spcPct val="90000"/>
-              </a:lnSpc>
-              <a:spcAft>
-                <a:spcPts val="600"/>
-              </a:spcAft>
-              <a:buFont typeface="Arial" panose="020B0604020202020204" pitchFamily="34" charset="0"/>
-              <a:buChar char="•"/>
-            </a:pPr>
-            <a:r>
-              <a:rPr lang="en-US" sz="2400" dirty="0">
-                <a:solidFill>
-                  <a:schemeClr val="bg1"/>
-                </a:solidFill>
-                <a:latin typeface="Arial" panose="020B0604020202020204" pitchFamily="34" charset="0"/>
-                <a:cs typeface="Arial" panose="020B0604020202020204" pitchFamily="34" charset="0"/>
-              </a:rPr>
-              <a:t>Water Level (J17)</a:t>
-            </a:r>
-          </a:p>
-          <a:p>
-            <a:pPr marL="342900" indent="-342900">
-              <a:lnSpc>
-                <a:spcPct val="90000"/>
-              </a:lnSpc>
-              <a:spcAft>
-                <a:spcPts val="600"/>
-              </a:spcAft>
-              <a:buFont typeface="Arial" panose="020B0604020202020204" pitchFamily="34" charset="0"/>
-              <a:buChar char="•"/>
-            </a:pPr>
-            <a:r>
-              <a:rPr lang="en-US" sz="2400" dirty="0">
-                <a:solidFill>
-                  <a:schemeClr val="bg1"/>
-                </a:solidFill>
-                <a:latin typeface="Arial" panose="020B0604020202020204" pitchFamily="34" charset="0"/>
-                <a:cs typeface="Arial" panose="020B0604020202020204" pitchFamily="34" charset="0"/>
-              </a:rPr>
-              <a:t>Temperature</a:t>
-            </a:r>
-          </a:p>
-          <a:p>
-            <a:pPr marL="342900" indent="-342900">
-              <a:lnSpc>
-                <a:spcPct val="90000"/>
-              </a:lnSpc>
-              <a:spcAft>
-                <a:spcPts val="600"/>
-              </a:spcAft>
-              <a:buFont typeface="Arial" panose="020B0604020202020204" pitchFamily="34" charset="0"/>
-              <a:buChar char="•"/>
-            </a:pPr>
-            <a:r>
-              <a:rPr lang="en-US" sz="2400" dirty="0">
-                <a:solidFill>
-                  <a:schemeClr val="bg1"/>
-                </a:solidFill>
-                <a:latin typeface="Arial" panose="020B0604020202020204" pitchFamily="34" charset="0"/>
-                <a:cs typeface="Arial" panose="020B0604020202020204" pitchFamily="34" charset="0"/>
-              </a:rPr>
-              <a:t>Humidity and Precipitation</a:t>
-            </a:r>
-          </a:p>
-          <a:p>
-            <a:pPr marL="342900" indent="-342900">
-              <a:lnSpc>
-                <a:spcPct val="90000"/>
-              </a:lnSpc>
-              <a:spcAft>
-                <a:spcPts val="600"/>
-              </a:spcAft>
-              <a:buFont typeface="Arial" panose="020B0604020202020204" pitchFamily="34" charset="0"/>
-              <a:buChar char="•"/>
-            </a:pPr>
-            <a:r>
-              <a:rPr lang="en-US" sz="2400" dirty="0">
-                <a:solidFill>
-                  <a:schemeClr val="bg1"/>
-                </a:solidFill>
-                <a:latin typeface="Arial" panose="020B0604020202020204" pitchFamily="34" charset="0"/>
-                <a:cs typeface="Arial" panose="020B0604020202020204" pitchFamily="34" charset="0"/>
-              </a:rPr>
-              <a:t>Change in Water Level by year (J17)</a:t>
-            </a:r>
-          </a:p>
-          <a:p>
-            <a:pPr marL="342900" indent="-342900">
-              <a:lnSpc>
-                <a:spcPct val="90000"/>
-              </a:lnSpc>
-              <a:spcAft>
-                <a:spcPts val="600"/>
-              </a:spcAft>
-              <a:buFont typeface="Arial" panose="020B0604020202020204" pitchFamily="34" charset="0"/>
-              <a:buChar char="•"/>
-            </a:pPr>
-            <a:r>
-              <a:rPr lang="en-US" sz="2400" dirty="0">
-                <a:solidFill>
-                  <a:schemeClr val="bg1"/>
-                </a:solidFill>
-                <a:latin typeface="Arial" panose="020B0604020202020204" pitchFamily="34" charset="0"/>
-                <a:cs typeface="Arial" panose="020B0604020202020204" pitchFamily="34" charset="0"/>
-              </a:rPr>
-              <a:t>Drought Levels for water restriction (Stage 1, Stage 2, Stage 3)</a:t>
-            </a:r>
-          </a:p>
-        </p:txBody>
-      </p:sp>
-    </p:spTree>
-    <p:extLst>
-      <p:ext uri="{BB962C8B-B14F-4D97-AF65-F5344CB8AC3E}">
-        <p14:creationId xmlns:p14="http://schemas.microsoft.com/office/powerpoint/2010/main" val="975043238"/>
-      </p:ext>
-    </p:extLst>
-  </p:cSld>
-  <p:clrMapOvr>
-    <a:masterClrMapping/>
-  </p:clrMapOvr>
-</p:sld>
-</file>
-
-<file path=ppt/slides/slide3.xml><?xml version="1.0" encoding="utf-8"?>
-<p:sld xmlns:a="http://schemas.openxmlformats.org/drawingml/2006/main" xmlns:r="http://schemas.openxmlformats.org/officeDocument/2006/relationships" xmlns:p="http://schemas.openxmlformats.org/presentationml/2006/main">
-  <p:cSld>
-    <p:bg>
-      <p:bgPr>
-        <a:blipFill dpi="0" rotWithShape="1">
-          <a:blip r:embed="rId2">
-            <a:lum/>
-            <a:extLst>
-              <a:ext uri="{837473B0-CC2E-450A-ABE3-18F120FF3D39}">
-                <a1611:picAttrSrcUrl xmlns:a1611="http://schemas.microsoft.com/office/drawing/2016/11/main" r:id="rId3"/>
-              </a:ext>
-            </a:extLst>
-          </a:blip>
-          <a:srcRect/>
-          <a:stretch>
-            <a:fillRect t="-21000" b="-21000"/>
-          </a:stretch>
-        </a:blipFill>
-        <a:effectLst/>
-      </p:bgPr>
-    </p:bg>
-    <p:spTree>
-      <p:nvGrpSpPr>
-        <p:cNvPr id="1" name=""/>
-        <p:cNvGrpSpPr/>
-        <p:nvPr/>
-      </p:nvGrpSpPr>
-      <p:grpSpPr>
-        <a:xfrm>
-          <a:off x="0" y="0"/>
-          <a:ext cx="0" cy="0"/>
-          <a:chOff x="0" y="0"/>
-          <a:chExt cx="0" cy="0"/>
-        </a:xfrm>
-      </p:grpSpPr>
-      <p:sp>
-        <p:nvSpPr>
-          <p:cNvPr id="2" name="Title 1">
-            <a:extLst>
-              <a:ext uri="{FF2B5EF4-FFF2-40B4-BE49-F238E27FC236}">
-                <a16:creationId xmlns:a16="http://schemas.microsoft.com/office/drawing/2014/main" id="{C57E683D-6D95-4A95-A5A2-142683694974}"/>
-              </a:ext>
-            </a:extLst>
-          </p:cNvPr>
-          <p:cNvSpPr>
-            <a:spLocks noGrp="1"/>
-          </p:cNvSpPr>
-          <p:nvPr>
-            <p:ph type="title"/>
-          </p:nvPr>
-        </p:nvSpPr>
-        <p:spPr>
-          <a:xfrm>
-            <a:off x="838200" y="161458"/>
-            <a:ext cx="10515600" cy="558511"/>
-          </a:xfrm>
-        </p:spPr>
-        <p:txBody>
-          <a:bodyPr>
-            <a:normAutofit fontScale="90000"/>
-          </a:bodyPr>
-          <a:lstStyle/>
-          <a:p>
-            <a:pPr algn="ctr"/>
-            <a:r>
-              <a:rPr lang="en-US" dirty="0">
-                <a:solidFill>
-                  <a:schemeClr val="bg1"/>
-                </a:solidFill>
-              </a:rPr>
-              <a:t>Questions</a:t>
-            </a:r>
-          </a:p>
-        </p:txBody>
-      </p:sp>
-      <p:sp>
-        <p:nvSpPr>
-          <p:cNvPr id="3" name="TextBox 2">
-            <a:extLst>
-              <a:ext uri="{FF2B5EF4-FFF2-40B4-BE49-F238E27FC236}">
-                <a16:creationId xmlns:a16="http://schemas.microsoft.com/office/drawing/2014/main" id="{A7F67253-29DD-4218-AD38-BBA255CE3CC9}"/>
-              </a:ext>
-            </a:extLst>
-          </p:cNvPr>
-          <p:cNvSpPr txBox="1"/>
-          <p:nvPr/>
-        </p:nvSpPr>
-        <p:spPr>
-          <a:xfrm>
-            <a:off x="360218" y="731676"/>
-            <a:ext cx="11831782" cy="2168543"/>
-          </a:xfrm>
-          <a:prstGeom prst="rect">
-            <a:avLst/>
-          </a:prstGeom>
-          <a:noFill/>
-          <a:effectLst>
-            <a:glow rad="101600">
-              <a:schemeClr val="accent1">
-                <a:satMod val="175000"/>
-                <a:alpha val="40000"/>
-              </a:schemeClr>
-            </a:glow>
-            <a:outerShdw blurRad="50800" dist="38100" dir="2700000" algn="tl" rotWithShape="0">
-              <a:schemeClr val="tx1">
-                <a:alpha val="40000"/>
-              </a:schemeClr>
-            </a:outerShdw>
-          </a:effectLst>
-        </p:spPr>
-        <p:txBody>
-          <a:bodyPr wrap="square" rtlCol="0" anchor="t">
-            <a:noAutofit/>
-          </a:bodyPr>
-          <a:lstStyle/>
-          <a:p>
-            <a:pPr>
-              <a:lnSpc>
-                <a:spcPct val="90000"/>
-              </a:lnSpc>
-              <a:spcAft>
-                <a:spcPts val="600"/>
-              </a:spcAft>
-            </a:pPr>
-            <a:r>
-              <a:rPr lang="en-US" b="1" dirty="0">
-                <a:solidFill>
-                  <a:schemeClr val="bg1"/>
-                </a:solidFill>
-                <a:latin typeface="Arial" panose="020B0604020202020204" pitchFamily="34" charset="0"/>
-                <a:cs typeface="Arial" panose="020B0604020202020204" pitchFamily="34" charset="0"/>
-              </a:rPr>
-              <a:t>Which variables help us establish a strong correlation with drop in water levels for well J17?</a:t>
-            </a:r>
-          </a:p>
-          <a:p>
-            <a:pPr>
-              <a:lnSpc>
-                <a:spcPct val="90000"/>
-              </a:lnSpc>
-              <a:spcAft>
-                <a:spcPts val="600"/>
-              </a:spcAft>
-            </a:pPr>
-            <a:endParaRPr lang="en-US" dirty="0">
-              <a:solidFill>
-                <a:schemeClr val="bg1"/>
-              </a:solidFill>
-              <a:latin typeface="Arial" panose="020B0604020202020204" pitchFamily="34" charset="0"/>
-              <a:cs typeface="Arial" panose="020B0604020202020204" pitchFamily="34" charset="0"/>
-            </a:endParaRPr>
-          </a:p>
-          <a:p>
-            <a:pPr marL="285750" indent="-285750">
-              <a:lnSpc>
-                <a:spcPct val="90000"/>
-              </a:lnSpc>
-              <a:spcAft>
-                <a:spcPts val="600"/>
-              </a:spcAft>
-              <a:buFont typeface="Calibri" panose="020F0502020204030204" pitchFamily="34" charset="0"/>
-              <a:buChar char="―"/>
-            </a:pPr>
-            <a:r>
-              <a:rPr lang="en-US" dirty="0">
-                <a:solidFill>
-                  <a:schemeClr val="bg1"/>
-                </a:solidFill>
-                <a:latin typeface="Arial" panose="020B0604020202020204" pitchFamily="34" charset="0"/>
-                <a:cs typeface="Arial" panose="020B0604020202020204" pitchFamily="34" charset="0"/>
-              </a:rPr>
-              <a:t>Did overall consumption of water increase in Bexar county over last 5 years resulting in decrease of water levels?</a:t>
-            </a:r>
-          </a:p>
-          <a:p>
-            <a:pPr marL="285750" indent="-285750">
-              <a:lnSpc>
-                <a:spcPct val="90000"/>
-              </a:lnSpc>
-              <a:spcAft>
-                <a:spcPts val="600"/>
-              </a:spcAft>
-              <a:buFont typeface="Calibri" panose="020F0502020204030204" pitchFamily="34" charset="0"/>
-              <a:buChar char="―"/>
-            </a:pPr>
-            <a:r>
-              <a:rPr lang="en-US" dirty="0">
-                <a:solidFill>
-                  <a:schemeClr val="bg1"/>
-                </a:solidFill>
-                <a:latin typeface="Arial" panose="020B0604020202020204" pitchFamily="34" charset="0"/>
-                <a:cs typeface="Arial" panose="020B0604020202020204" pitchFamily="34" charset="0"/>
-              </a:rPr>
-              <a:t>Did overall the overall Humidity and precipitation affect water levels?</a:t>
-            </a:r>
-          </a:p>
-          <a:p>
-            <a:pPr marL="285750" indent="-285750">
-              <a:lnSpc>
-                <a:spcPct val="90000"/>
-              </a:lnSpc>
-              <a:spcAft>
-                <a:spcPts val="600"/>
-              </a:spcAft>
-              <a:buFont typeface="Calibri" panose="020F0502020204030204" pitchFamily="34" charset="0"/>
-              <a:buChar char="―"/>
-            </a:pPr>
-            <a:r>
-              <a:rPr lang="en-US" dirty="0">
-                <a:solidFill>
-                  <a:schemeClr val="bg1"/>
-                </a:solidFill>
-                <a:latin typeface="Arial" panose="020B0604020202020204" pitchFamily="34" charset="0"/>
-                <a:cs typeface="Arial" panose="020B0604020202020204" pitchFamily="34" charset="0"/>
-              </a:rPr>
-              <a:t>Did the overall temperature change in last 5 years affect the water levels?</a:t>
-            </a:r>
-          </a:p>
-          <a:p>
-            <a:pPr marL="285750" indent="-285750">
-              <a:lnSpc>
-                <a:spcPct val="90000"/>
-              </a:lnSpc>
-              <a:spcAft>
-                <a:spcPts val="600"/>
-              </a:spcAft>
-              <a:buFont typeface="Calibri" panose="020F0502020204030204" pitchFamily="34" charset="0"/>
-              <a:buChar char="―"/>
-            </a:pPr>
-            <a:r>
-              <a:rPr lang="en-US" dirty="0">
-                <a:solidFill>
-                  <a:schemeClr val="bg1"/>
-                </a:solidFill>
-                <a:latin typeface="Arial" panose="020B0604020202020204" pitchFamily="34" charset="0"/>
-                <a:cs typeface="Arial" panose="020B0604020202020204" pitchFamily="34" charset="0"/>
-              </a:rPr>
-              <a:t>How does San Antonio Water Systems implement drought restrictions. Based on recent data, are current restrictions effective in maintaining and/or replenishing water level in well J17?</a:t>
-            </a:r>
-          </a:p>
-          <a:p>
-            <a:pPr marL="285750" indent="-285750">
-              <a:lnSpc>
-                <a:spcPct val="90000"/>
-              </a:lnSpc>
-              <a:spcAft>
-                <a:spcPts val="600"/>
-              </a:spcAft>
-              <a:buFont typeface="Calibri" panose="020F0502020204030204" pitchFamily="34" charset="0"/>
-              <a:buChar char="―"/>
-            </a:pPr>
-            <a:endParaRPr lang="en-US" dirty="0">
-              <a:solidFill>
-                <a:schemeClr val="bg1"/>
-              </a:solidFill>
-              <a:latin typeface="Arial" panose="020B0604020202020204" pitchFamily="34" charset="0"/>
-              <a:cs typeface="Arial" panose="020B0604020202020204" pitchFamily="34" charset="0"/>
-            </a:endParaRPr>
-          </a:p>
-          <a:p>
-            <a:pPr marL="285750" indent="-285750">
-              <a:lnSpc>
-                <a:spcPct val="90000"/>
-              </a:lnSpc>
-              <a:spcAft>
-                <a:spcPts val="600"/>
-              </a:spcAft>
-              <a:buFont typeface="Calibri" panose="020F0502020204030204" pitchFamily="34" charset="0"/>
-              <a:buChar char="―"/>
-            </a:pPr>
-            <a:endParaRPr lang="en-US" dirty="0">
-              <a:solidFill>
-                <a:schemeClr val="bg1"/>
-              </a:solidFill>
-              <a:latin typeface="Arial" panose="020B0604020202020204" pitchFamily="34" charset="0"/>
-              <a:cs typeface="Arial" panose="020B0604020202020204" pitchFamily="34" charset="0"/>
-            </a:endParaRPr>
-          </a:p>
-          <a:p>
-            <a:pPr marL="285750" indent="-285750">
-              <a:lnSpc>
-                <a:spcPct val="90000"/>
-              </a:lnSpc>
-              <a:spcAft>
-                <a:spcPts val="600"/>
-              </a:spcAft>
-              <a:buFont typeface="Calibri" panose="020F0502020204030204" pitchFamily="34" charset="0"/>
-              <a:buChar char="―"/>
-            </a:pPr>
-            <a:endParaRPr lang="en-US" dirty="0">
-              <a:solidFill>
-                <a:schemeClr val="bg1"/>
-              </a:solidFill>
-              <a:latin typeface="Arial" panose="020B0604020202020204" pitchFamily="34" charset="0"/>
-              <a:cs typeface="Arial" panose="020B0604020202020204" pitchFamily="34" charset="0"/>
-            </a:endParaRPr>
-          </a:p>
-        </p:txBody>
-      </p:sp>
-      <p:sp>
-        <p:nvSpPr>
-          <p:cNvPr id="4" name="TextBox 3">
-            <a:extLst>
-              <a:ext uri="{FF2B5EF4-FFF2-40B4-BE49-F238E27FC236}">
-                <a16:creationId xmlns:a16="http://schemas.microsoft.com/office/drawing/2014/main" id="{7AEE6AA5-CDBD-4DD9-B318-FF9BCD1A798B}"/>
-              </a:ext>
-            </a:extLst>
-          </p:cNvPr>
-          <p:cNvSpPr txBox="1"/>
-          <p:nvPr/>
-        </p:nvSpPr>
-        <p:spPr>
-          <a:xfrm>
-            <a:off x="258619" y="3957781"/>
-            <a:ext cx="11831782" cy="2168543"/>
-          </a:xfrm>
-          <a:prstGeom prst="rect">
-            <a:avLst/>
-          </a:prstGeom>
-          <a:noFill/>
-          <a:effectLst>
-            <a:glow rad="101600">
-              <a:schemeClr val="accent1">
-                <a:satMod val="175000"/>
-                <a:alpha val="40000"/>
-              </a:schemeClr>
-            </a:glow>
-            <a:outerShdw blurRad="50800" dist="38100" dir="2700000" algn="tl" rotWithShape="0">
-              <a:schemeClr val="tx1">
-                <a:alpha val="40000"/>
-              </a:schemeClr>
-            </a:outerShdw>
-          </a:effectLst>
-        </p:spPr>
-        <p:txBody>
-          <a:bodyPr wrap="square" rtlCol="0" anchor="t">
-            <a:noAutofit/>
-          </a:bodyPr>
-          <a:lstStyle/>
-          <a:p>
-            <a:pPr>
-              <a:lnSpc>
-                <a:spcPct val="90000"/>
-              </a:lnSpc>
-              <a:spcAft>
-                <a:spcPts val="600"/>
-              </a:spcAft>
-            </a:pPr>
-            <a:r>
-              <a:rPr lang="en-US" b="1" dirty="0">
-                <a:solidFill>
-                  <a:schemeClr val="bg1"/>
-                </a:solidFill>
-                <a:latin typeface="Arial" panose="020B0604020202020204" pitchFamily="34" charset="0"/>
-                <a:cs typeface="Arial" panose="020B0604020202020204" pitchFamily="34" charset="0"/>
-              </a:rPr>
-              <a:t>How do we look at this issue as a group based on available data?</a:t>
-            </a:r>
-          </a:p>
-          <a:p>
-            <a:pPr>
-              <a:lnSpc>
-                <a:spcPct val="90000"/>
-              </a:lnSpc>
-              <a:spcAft>
-                <a:spcPts val="600"/>
-              </a:spcAft>
-            </a:pPr>
-            <a:endParaRPr lang="en-US" dirty="0">
-              <a:solidFill>
-                <a:schemeClr val="bg1"/>
-              </a:solidFill>
-              <a:latin typeface="Arial" panose="020B0604020202020204" pitchFamily="34" charset="0"/>
-              <a:cs typeface="Arial" panose="020B0604020202020204" pitchFamily="34" charset="0"/>
-            </a:endParaRPr>
-          </a:p>
-          <a:p>
-            <a:pPr marL="285750" indent="-285750">
-              <a:lnSpc>
-                <a:spcPct val="90000"/>
-              </a:lnSpc>
-              <a:spcAft>
-                <a:spcPts val="600"/>
-              </a:spcAft>
-              <a:buFont typeface="Calibri" panose="020F0502020204030204" pitchFamily="34" charset="0"/>
-              <a:buChar char="―"/>
-            </a:pPr>
-            <a:r>
-              <a:rPr lang="en-US" dirty="0">
-                <a:solidFill>
-                  <a:schemeClr val="bg1"/>
-                </a:solidFill>
-                <a:latin typeface="Arial" panose="020B0604020202020204" pitchFamily="34" charset="0"/>
-                <a:cs typeface="Arial" panose="020B0604020202020204" pitchFamily="34" charset="0"/>
-              </a:rPr>
-              <a:t>Graphically we represented our data in scatter plots and bar charts…….</a:t>
-            </a:r>
-          </a:p>
-          <a:p>
-            <a:pPr marL="285750" indent="-285750">
-              <a:lnSpc>
-                <a:spcPct val="90000"/>
-              </a:lnSpc>
-              <a:spcAft>
-                <a:spcPts val="600"/>
-              </a:spcAft>
-              <a:buFont typeface="Calibri" panose="020F0502020204030204" pitchFamily="34" charset="0"/>
-              <a:buChar char="―"/>
-            </a:pPr>
-            <a:r>
-              <a:rPr lang="en-US" dirty="0">
-                <a:solidFill>
-                  <a:schemeClr val="bg1"/>
-                </a:solidFill>
-                <a:latin typeface="Arial" panose="020B0604020202020204" pitchFamily="34" charset="0"/>
-                <a:cs typeface="Arial" panose="020B0604020202020204" pitchFamily="34" charset="0"/>
-              </a:rPr>
-              <a:t>Correlation/P-value, chi value.</a:t>
-            </a:r>
-          </a:p>
-          <a:p>
-            <a:pPr marL="285750" indent="-285750">
-              <a:lnSpc>
-                <a:spcPct val="90000"/>
-              </a:lnSpc>
-              <a:spcAft>
-                <a:spcPts val="600"/>
-              </a:spcAft>
-              <a:buFont typeface="Calibri" panose="020F0502020204030204" pitchFamily="34" charset="0"/>
-              <a:buChar char="―"/>
-            </a:pPr>
-            <a:r>
-              <a:rPr lang="en-US" dirty="0">
-                <a:solidFill>
-                  <a:schemeClr val="bg1"/>
-                </a:solidFill>
-                <a:latin typeface="Arial" panose="020B0604020202020204" pitchFamily="34" charset="0"/>
-                <a:cs typeface="Arial" panose="020B0604020202020204" pitchFamily="34" charset="0"/>
-              </a:rPr>
-              <a:t>We found multiple sources of data and the main challenge was to clean and merge </a:t>
-            </a:r>
-            <a:r>
-              <a:rPr lang="en-US" dirty="0" err="1">
-                <a:solidFill>
-                  <a:schemeClr val="bg1"/>
-                </a:solidFill>
-                <a:latin typeface="Arial" panose="020B0604020202020204" pitchFamily="34" charset="0"/>
-                <a:cs typeface="Arial" panose="020B0604020202020204" pitchFamily="34" charset="0"/>
-              </a:rPr>
-              <a:t>dataframes</a:t>
-            </a:r>
-            <a:r>
-              <a:rPr lang="en-US" dirty="0">
-                <a:solidFill>
-                  <a:schemeClr val="bg1"/>
-                </a:solidFill>
-                <a:latin typeface="Arial" panose="020B0604020202020204" pitchFamily="34" charset="0"/>
-                <a:cs typeface="Arial" panose="020B0604020202020204" pitchFamily="34" charset="0"/>
-              </a:rPr>
-              <a:t>……</a:t>
-            </a:r>
-          </a:p>
-        </p:txBody>
-      </p:sp>
-    </p:spTree>
-    <p:extLst>
-      <p:ext uri="{BB962C8B-B14F-4D97-AF65-F5344CB8AC3E}">
-        <p14:creationId xmlns:p14="http://schemas.microsoft.com/office/powerpoint/2010/main" val="2133866945"/>
-      </p:ext>
-    </p:extLst>
-  </p:cSld>
-  <p:clrMapOvr>
-    <a:masterClrMapping/>
-  </p:clrMapOvr>
-</p:sld>
-</file>
-
-<file path=ppt/slides/slide4.xml><?xml version="1.0" encoding="utf-8"?>
-<p:sld xmlns:a="http://schemas.openxmlformats.org/drawingml/2006/main" xmlns:r="http://schemas.openxmlformats.org/officeDocument/2006/relationships" xmlns:p="http://schemas.openxmlformats.org/presentationml/2006/main">
-  <p:cSld>
-    <p:bg>
-      <p:bgPr>
-        <a:blipFill dpi="0" rotWithShape="1">
-          <a:blip r:embed="rId2">
-            <a:lum/>
-            <a:extLst>
-              <a:ext uri="{837473B0-CC2E-450A-ABE3-18F120FF3D39}">
-                <a1611:picAttrSrcUrl xmlns:a1611="http://schemas.microsoft.com/office/drawing/2016/11/main" r:id="rId3"/>
-              </a:ext>
-            </a:extLst>
-          </a:blip>
-          <a:srcRect/>
-          <a:stretch>
-            <a:fillRect t="-21000" b="-21000"/>
-          </a:stretch>
-        </a:blipFill>
-        <a:effectLst/>
-      </p:bgPr>
-    </p:bg>
-    <p:spTree>
-      <p:nvGrpSpPr>
-        <p:cNvPr id="1" name=""/>
-        <p:cNvGrpSpPr/>
-        <p:nvPr/>
-      </p:nvGrpSpPr>
-      <p:grpSpPr>
-        <a:xfrm>
-          <a:off x="0" y="0"/>
-          <a:ext cx="0" cy="0"/>
-          <a:chOff x="0" y="0"/>
-          <a:chExt cx="0" cy="0"/>
-        </a:xfrm>
-      </p:grpSpPr>
-      <p:sp>
-        <p:nvSpPr>
-          <p:cNvPr id="2" name="Title 1">
-            <a:extLst>
-              <a:ext uri="{FF2B5EF4-FFF2-40B4-BE49-F238E27FC236}">
-                <a16:creationId xmlns:a16="http://schemas.microsoft.com/office/drawing/2014/main" id="{C57E683D-6D95-4A95-A5A2-142683694974}"/>
-              </a:ext>
-            </a:extLst>
-          </p:cNvPr>
-          <p:cNvSpPr>
-            <a:spLocks noGrp="1"/>
-          </p:cNvSpPr>
-          <p:nvPr>
-            <p:ph type="title"/>
-          </p:nvPr>
-        </p:nvSpPr>
-        <p:spPr>
-          <a:xfrm>
-            <a:off x="838200" y="161458"/>
-            <a:ext cx="10515600" cy="558511"/>
-          </a:xfrm>
-        </p:spPr>
-        <p:txBody>
-          <a:bodyPr>
-            <a:normAutofit fontScale="90000"/>
-          </a:bodyPr>
-          <a:lstStyle/>
-          <a:p>
-            <a:pPr algn="ctr"/>
-            <a:r>
-              <a:rPr lang="en-US" dirty="0">
-                <a:solidFill>
-                  <a:schemeClr val="bg1"/>
-                </a:solidFill>
-              </a:rPr>
               <a:t>Project Data Sources</a:t>
             </a:r>
           </a:p>
@@ -6102,7 +6087,7 @@
         </p:spPr>
         <p:txBody>
           <a:bodyPr wrap="square" rtlCol="0" anchor="t">
-            <a:normAutofit/>
+            <a:normAutofit lnSpcReduction="10000"/>
           </a:bodyPr>
           <a:lstStyle/>
           <a:p>
@@ -6131,6 +6116,355 @@
               </a:rPr>
               <a:t>.csv data:</a:t>
             </a:r>
+          </a:p>
+          <a:p>
+            <a:pPr>
+              <a:lnSpc>
+                <a:spcPct val="90000"/>
+              </a:lnSpc>
+              <a:spcAft>
+                <a:spcPts val="600"/>
+              </a:spcAft>
+            </a:pPr>
+            <a:endParaRPr lang="en-US" sz="2400" b="1" u="sng" dirty="0">
+              <a:solidFill>
+                <a:schemeClr val="bg1"/>
+              </a:solidFill>
+              <a:effectLst>
+                <a:outerShdw blurRad="38100" dist="38100" dir="2700000" algn="tl">
+                  <a:srgbClr val="000000">
+                    <a:alpha val="43137"/>
+                  </a:srgbClr>
+                </a:outerShdw>
+              </a:effectLst>
+              <a:latin typeface="Arial" panose="020B0604020202020204" pitchFamily="34" charset="0"/>
+              <a:cs typeface="Arial" panose="020B0604020202020204" pitchFamily="34" charset="0"/>
+              <a:hlinkClick r:id="rId4"/>
+            </a:endParaRPr>
+          </a:p>
+          <a:p>
+            <a:pPr>
+              <a:lnSpc>
+                <a:spcPct val="90000"/>
+              </a:lnSpc>
+              <a:spcAft>
+                <a:spcPts val="600"/>
+              </a:spcAft>
+            </a:pPr>
+            <a:r>
+              <a:rPr lang="en-US" sz="2400" b="1" u="sng" dirty="0">
+                <a:solidFill>
+                  <a:schemeClr val="bg1"/>
+                </a:solidFill>
+                <a:effectLst>
+                  <a:outerShdw blurRad="38100" dist="38100" dir="2700000" algn="tl">
+                    <a:srgbClr val="000000">
+                      <a:alpha val="43137"/>
+                    </a:srgbClr>
+                  </a:outerShdw>
+                </a:effectLst>
+                <a:latin typeface="Arial" panose="020B0604020202020204" pitchFamily="34" charset="0"/>
+                <a:cs typeface="Arial" panose="020B0604020202020204" pitchFamily="34" charset="0"/>
+                <a:hlinkClick r:id="rId4"/>
+              </a:rPr>
+              <a:t>https://www.wunderground.com/</a:t>
+            </a:r>
+            <a:endParaRPr lang="en-US" sz="2400" b="1" u="sng" dirty="0">
+              <a:solidFill>
+                <a:schemeClr val="bg1"/>
+              </a:solidFill>
+              <a:effectLst>
+                <a:outerShdw blurRad="38100" dist="38100" dir="2700000" algn="tl">
+                  <a:srgbClr val="000000">
+                    <a:alpha val="43137"/>
+                  </a:srgbClr>
+                </a:outerShdw>
+              </a:effectLst>
+              <a:latin typeface="Arial" panose="020B0604020202020204" pitchFamily="34" charset="0"/>
+              <a:cs typeface="Arial" panose="020B0604020202020204" pitchFamily="34" charset="0"/>
+            </a:endParaRPr>
+          </a:p>
+          <a:p>
+            <a:pPr>
+              <a:lnSpc>
+                <a:spcPct val="90000"/>
+              </a:lnSpc>
+              <a:spcAft>
+                <a:spcPts val="600"/>
+              </a:spcAft>
+            </a:pPr>
+            <a:r>
+              <a:rPr lang="en-US" sz="2400" b="1" u="sng" dirty="0">
+                <a:solidFill>
+                  <a:schemeClr val="bg1"/>
+                </a:solidFill>
+                <a:effectLst>
+                  <a:outerShdw blurRad="38100" dist="38100" dir="2700000" algn="tl">
+                    <a:srgbClr val="000000">
+                      <a:alpha val="43137"/>
+                    </a:srgbClr>
+                  </a:outerShdw>
+                </a:effectLst>
+                <a:latin typeface="Arial" panose="020B0604020202020204" pitchFamily="34" charset="0"/>
+                <a:cs typeface="Arial" panose="020B0604020202020204" pitchFamily="34" charset="0"/>
+                <a:hlinkClick r:id="rId5"/>
+              </a:rPr>
+              <a:t>https://www.edwardsaquifer.org/science-maps/aquifer-data/historical-data/</a:t>
+            </a:r>
+            <a:endParaRPr lang="en-US" sz="2400" b="1" u="sng" dirty="0">
+              <a:solidFill>
+                <a:schemeClr val="bg1"/>
+              </a:solidFill>
+              <a:effectLst>
+                <a:outerShdw blurRad="38100" dist="38100" dir="2700000" algn="tl">
+                  <a:srgbClr val="000000">
+                    <a:alpha val="43137"/>
+                  </a:srgbClr>
+                </a:outerShdw>
+              </a:effectLst>
+              <a:latin typeface="Arial" panose="020B0604020202020204" pitchFamily="34" charset="0"/>
+              <a:cs typeface="Arial" panose="020B0604020202020204" pitchFamily="34" charset="0"/>
+            </a:endParaRPr>
+          </a:p>
+          <a:p>
+            <a:pPr>
+              <a:lnSpc>
+                <a:spcPct val="90000"/>
+              </a:lnSpc>
+              <a:spcAft>
+                <a:spcPts val="600"/>
+              </a:spcAft>
+            </a:pPr>
+            <a:r>
+              <a:rPr lang="en-US" sz="2400" b="1" u="sng" dirty="0">
+                <a:solidFill>
+                  <a:schemeClr val="bg1"/>
+                </a:solidFill>
+                <a:effectLst>
+                  <a:outerShdw blurRad="38100" dist="38100" dir="2700000" algn="tl">
+                    <a:srgbClr val="000000">
+                      <a:alpha val="43137"/>
+                    </a:srgbClr>
+                  </a:outerShdw>
+                </a:effectLst>
+                <a:latin typeface="Arial" panose="020B0604020202020204" pitchFamily="34" charset="0"/>
+                <a:cs typeface="Arial" panose="020B0604020202020204" pitchFamily="34" charset="0"/>
+                <a:hlinkClick r:id="rId6"/>
+              </a:rPr>
+              <a:t>https://droughtmonitor.unl.edu/DmData/DataDownload.aspx</a:t>
+            </a:r>
+            <a:endParaRPr lang="en-US" sz="2400" b="1" u="sng" dirty="0">
+              <a:solidFill>
+                <a:schemeClr val="bg1"/>
+              </a:solidFill>
+              <a:effectLst>
+                <a:outerShdw blurRad="38100" dist="38100" dir="2700000" algn="tl">
+                  <a:srgbClr val="000000">
+                    <a:alpha val="43137"/>
+                  </a:srgbClr>
+                </a:outerShdw>
+              </a:effectLst>
+              <a:latin typeface="Arial" panose="020B0604020202020204" pitchFamily="34" charset="0"/>
+              <a:cs typeface="Arial" panose="020B0604020202020204" pitchFamily="34" charset="0"/>
+            </a:endParaRPr>
+          </a:p>
+          <a:p>
+            <a:pPr marL="0" marR="0" lvl="0" indent="0" algn="l" defTabSz="914400" rtl="0" eaLnBrk="1" fontAlgn="auto" latinLnBrk="0" hangingPunct="1">
+              <a:lnSpc>
+                <a:spcPct val="90000"/>
+              </a:lnSpc>
+              <a:spcBef>
+                <a:spcPts val="0"/>
+              </a:spcBef>
+              <a:spcAft>
+                <a:spcPts val="600"/>
+              </a:spcAft>
+              <a:buClrTx/>
+              <a:buSzTx/>
+              <a:buFontTx/>
+              <a:buNone/>
+              <a:tabLst/>
+              <a:defRPr/>
+            </a:pPr>
+            <a:r>
+              <a:rPr kumimoji="0" lang="en-US" sz="2400" b="1" i="0" u="sng" strike="noStrike" kern="1200" cap="none" spc="0" normalizeH="0" baseline="0" noProof="0" dirty="0">
+                <a:ln>
+                  <a:noFill/>
+                </a:ln>
+                <a:solidFill>
+                  <a:prstClr val="white"/>
+                </a:solidFill>
+                <a:effectLst>
+                  <a:outerShdw blurRad="38100" dist="38100" dir="2700000" algn="tl">
+                    <a:srgbClr val="000000">
+                      <a:alpha val="43137"/>
+                    </a:srgbClr>
+                  </a:outerShdw>
+                </a:effectLst>
+                <a:uLnTx/>
+                <a:uFillTx/>
+                <a:latin typeface="Arial" panose="020B0604020202020204" pitchFamily="34" charset="0"/>
+                <a:ea typeface="+mn-ea"/>
+                <a:cs typeface="Arial" panose="020B0604020202020204" pitchFamily="34" charset="0"/>
+              </a:rPr>
+              <a:t>Weather Historical Data</a:t>
+            </a:r>
+          </a:p>
+          <a:p>
+            <a:pPr marL="0" marR="0" lvl="0" indent="0" algn="l" defTabSz="914400" rtl="0" eaLnBrk="1" fontAlgn="auto" latinLnBrk="0" hangingPunct="1">
+              <a:lnSpc>
+                <a:spcPct val="90000"/>
+              </a:lnSpc>
+              <a:spcBef>
+                <a:spcPts val="0"/>
+              </a:spcBef>
+              <a:spcAft>
+                <a:spcPts val="600"/>
+              </a:spcAft>
+              <a:buClrTx/>
+              <a:buSzTx/>
+              <a:buFontTx/>
+              <a:buNone/>
+              <a:tabLst/>
+              <a:defRPr/>
+            </a:pPr>
+            <a:r>
+              <a:rPr kumimoji="0" lang="en-US" sz="2400" b="1" i="0" u="sng" strike="noStrike" kern="1200" cap="none" spc="0" normalizeH="0" baseline="0" noProof="0" dirty="0">
+                <a:ln>
+                  <a:noFill/>
+                </a:ln>
+                <a:solidFill>
+                  <a:prstClr val="white"/>
+                </a:solidFill>
+                <a:effectLst>
+                  <a:outerShdw blurRad="38100" dist="38100" dir="2700000" algn="tl">
+                    <a:srgbClr val="000000">
+                      <a:alpha val="43137"/>
+                    </a:srgbClr>
+                  </a:outerShdw>
+                </a:effectLst>
+                <a:uLnTx/>
+                <a:uFillTx/>
+                <a:latin typeface="Arial" panose="020B0604020202020204" pitchFamily="34" charset="0"/>
+                <a:ea typeface="+mn-ea"/>
+                <a:cs typeface="Arial" panose="020B0604020202020204" pitchFamily="34" charset="0"/>
+              </a:rPr>
+              <a:t>J17WL Well Historical Data</a:t>
+            </a:r>
+          </a:p>
+          <a:p>
+            <a:pPr marL="0" marR="0" lvl="0" indent="0" algn="l" defTabSz="914400" rtl="0" eaLnBrk="1" fontAlgn="auto" latinLnBrk="0" hangingPunct="1">
+              <a:lnSpc>
+                <a:spcPct val="90000"/>
+              </a:lnSpc>
+              <a:spcBef>
+                <a:spcPts val="0"/>
+              </a:spcBef>
+              <a:spcAft>
+                <a:spcPts val="600"/>
+              </a:spcAft>
+              <a:buClrTx/>
+              <a:buSzTx/>
+              <a:buFontTx/>
+              <a:buNone/>
+              <a:tabLst/>
+              <a:defRPr/>
+            </a:pPr>
+            <a:r>
+              <a:rPr kumimoji="0" lang="en-US" sz="2400" b="1" i="0" u="sng" strike="noStrike" kern="1200" cap="none" spc="0" normalizeH="0" baseline="0" noProof="0" dirty="0">
+                <a:ln>
+                  <a:noFill/>
+                </a:ln>
+                <a:solidFill>
+                  <a:prstClr val="white"/>
+                </a:solidFill>
+                <a:effectLst>
+                  <a:outerShdw blurRad="38100" dist="38100" dir="2700000" algn="tl">
+                    <a:srgbClr val="000000">
+                      <a:alpha val="43137"/>
+                    </a:srgbClr>
+                  </a:outerShdw>
+                </a:effectLst>
+                <a:uLnTx/>
+                <a:uFillTx/>
+                <a:latin typeface="Arial" panose="020B0604020202020204" pitchFamily="34" charset="0"/>
+                <a:ea typeface="+mn-ea"/>
+                <a:cs typeface="Arial" panose="020B0604020202020204" pitchFamily="34" charset="0"/>
+              </a:rPr>
+              <a:t>Drought Conditions</a:t>
+            </a:r>
+          </a:p>
+          <a:p>
+            <a:pPr>
+              <a:lnSpc>
+                <a:spcPct val="90000"/>
+              </a:lnSpc>
+              <a:spcAft>
+                <a:spcPts val="600"/>
+              </a:spcAft>
+            </a:pPr>
+            <a:endParaRPr lang="en-US" sz="2400" b="1" u="sng" dirty="0">
+              <a:solidFill>
+                <a:schemeClr val="bg1"/>
+              </a:solidFill>
+              <a:effectLst>
+                <a:outerShdw blurRad="38100" dist="38100" dir="2700000" algn="tl">
+                  <a:srgbClr val="000000">
+                    <a:alpha val="43137"/>
+                  </a:srgbClr>
+                </a:outerShdw>
+              </a:effectLst>
+              <a:latin typeface="Arial" panose="020B0604020202020204" pitchFamily="34" charset="0"/>
+              <a:cs typeface="Arial" panose="020B0604020202020204" pitchFamily="34" charset="0"/>
+            </a:endParaRPr>
+          </a:p>
+          <a:p>
+            <a:pPr>
+              <a:lnSpc>
+                <a:spcPct val="90000"/>
+              </a:lnSpc>
+              <a:spcAft>
+                <a:spcPts val="600"/>
+              </a:spcAft>
+            </a:pPr>
+            <a:endParaRPr lang="en-US" sz="2400" b="1" u="sng" dirty="0">
+              <a:solidFill>
+                <a:schemeClr val="bg1"/>
+              </a:solidFill>
+              <a:effectLst>
+                <a:outerShdw blurRad="38100" dist="38100" dir="2700000" algn="tl">
+                  <a:srgbClr val="000000">
+                    <a:alpha val="43137"/>
+                  </a:srgbClr>
+                </a:outerShdw>
+              </a:effectLst>
+              <a:latin typeface="Arial" panose="020B0604020202020204" pitchFamily="34" charset="0"/>
+              <a:cs typeface="Arial" panose="020B0604020202020204" pitchFamily="34" charset="0"/>
+            </a:endParaRPr>
+          </a:p>
+          <a:p>
+            <a:pPr>
+              <a:lnSpc>
+                <a:spcPct val="90000"/>
+              </a:lnSpc>
+              <a:spcAft>
+                <a:spcPts val="600"/>
+              </a:spcAft>
+            </a:pPr>
+            <a:endParaRPr lang="en-US" sz="2400" b="1" u="sng" dirty="0">
+              <a:solidFill>
+                <a:schemeClr val="bg1"/>
+              </a:solidFill>
+              <a:effectLst>
+                <a:outerShdw blurRad="38100" dist="38100" dir="2700000" algn="tl">
+                  <a:srgbClr val="000000">
+                    <a:alpha val="43137"/>
+                  </a:srgbClr>
+                </a:outerShdw>
+              </a:effectLst>
+              <a:latin typeface="Arial" panose="020B0604020202020204" pitchFamily="34" charset="0"/>
+              <a:cs typeface="Arial" panose="020B0604020202020204" pitchFamily="34" charset="0"/>
+            </a:endParaRPr>
           </a:p>
           <a:p>
             <a:pPr>
@@ -6242,7 +6576,7 @@
           <p:nvPr/>
         </p:nvPicPr>
         <p:blipFill>
-          <a:blip r:embed="rId4"/>
+          <a:blip r:embed="rId7"/>
           <a:stretch>
             <a:fillRect/>
           </a:stretch>
@@ -6387,280 +6721,104 @@
           </a:bodyPr>
           <a:lstStyle/>
           <a:p>
-            <a:pPr marL="0" marR="0" lvl="0" indent="0" algn="l" defTabSz="914400" rtl="0" eaLnBrk="1" fontAlgn="auto" latinLnBrk="0" hangingPunct="1">
+            <a:pPr>
               <a:lnSpc>
                 <a:spcPct val="90000"/>
               </a:lnSpc>
-              <a:spcBef>
-                <a:spcPts val="0"/>
-              </a:spcBef>
               <a:spcAft>
                 <a:spcPts val="600"/>
               </a:spcAft>
-              <a:buClrTx/>
-              <a:buSzTx/>
-              <a:buFontTx/>
-              <a:buNone/>
-              <a:tabLst/>
-              <a:defRPr/>
             </a:pPr>
             <a:r>
-              <a:rPr kumimoji="0" lang="en-US" sz="2400" b="1" i="0" u="sng" strike="noStrike" kern="1200" cap="none" spc="0" normalizeH="0" baseline="0" noProof="0" dirty="0">
-                <a:ln>
-                  <a:noFill/>
-                </a:ln>
+              <a:rPr lang="en-US" sz="2400" dirty="0">
                 <a:solidFill>
-                  <a:prstClr val="white"/>
+                  <a:schemeClr val="bg1"/>
                 </a:solidFill>
-                <a:effectLst>
-                  <a:outerShdw blurRad="38100" dist="38100" dir="2700000" algn="tl">
-                    <a:srgbClr val="000000">
-                      <a:alpha val="43137"/>
-                    </a:srgbClr>
-                  </a:outerShdw>
-                </a:effectLst>
-                <a:uLnTx/>
-                <a:uFillTx/>
                 <a:latin typeface="Arial" panose="020B0604020202020204" pitchFamily="34" charset="0"/>
-                <a:ea typeface="+mn-ea"/>
                 <a:cs typeface="Arial" panose="020B0604020202020204" pitchFamily="34" charset="0"/>
               </a:rPr>
-              <a:t>Weather Historical Data</a:t>
-            </a:r>
-          </a:p>
-          <a:p>
-            <a:pPr marL="0" marR="0" lvl="0" indent="0" algn="l" defTabSz="914400" rtl="0" eaLnBrk="1" fontAlgn="auto" latinLnBrk="0" hangingPunct="1">
+              <a:t>Water Level (J17)</a:t>
+            </a:r>
+          </a:p>
+          <a:p>
+            <a:pPr>
               <a:lnSpc>
                 <a:spcPct val="90000"/>
               </a:lnSpc>
-              <a:spcBef>
-                <a:spcPts val="0"/>
-              </a:spcBef>
               <a:spcAft>
                 <a:spcPts val="600"/>
               </a:spcAft>
-              <a:buClrTx/>
-              <a:buSzTx/>
-              <a:buFontTx/>
-              <a:buNone/>
-              <a:tabLst/>
-              <a:defRPr/>
             </a:pPr>
             <a:r>
-              <a:rPr kumimoji="0" lang="en-US" sz="2400" b="1" i="0" u="sng" strike="noStrike" kern="1200" cap="none" spc="0" normalizeH="0" baseline="0" noProof="0" dirty="0">
-                <a:ln>
-                  <a:noFill/>
-                </a:ln>
+              <a:rPr lang="en-US" sz="2400" dirty="0">
                 <a:solidFill>
-                  <a:prstClr val="white"/>
+                  <a:schemeClr val="bg1"/>
                 </a:solidFill>
-                <a:effectLst>
-                  <a:outerShdw blurRad="38100" dist="38100" dir="2700000" algn="tl">
-                    <a:srgbClr val="000000">
-                      <a:alpha val="43137"/>
-                    </a:srgbClr>
-                  </a:outerShdw>
-                </a:effectLst>
-                <a:uLnTx/>
-                <a:uFillTx/>
                 <a:latin typeface="Arial" panose="020B0604020202020204" pitchFamily="34" charset="0"/>
-                <a:ea typeface="+mn-ea"/>
                 <a:cs typeface="Arial" panose="020B0604020202020204" pitchFamily="34" charset="0"/>
               </a:rPr>
-              <a:t>J17WL Well Historical Data</a:t>
-            </a:r>
-          </a:p>
-          <a:p>
-            <a:pPr marL="0" marR="0" lvl="0" indent="0" algn="l" defTabSz="914400" rtl="0" eaLnBrk="1" fontAlgn="auto" latinLnBrk="0" hangingPunct="1">
+              <a:t>Temperature</a:t>
+            </a:r>
+          </a:p>
+          <a:p>
+            <a:pPr>
               <a:lnSpc>
                 <a:spcPct val="90000"/>
               </a:lnSpc>
-              <a:spcBef>
-                <a:spcPts val="0"/>
-              </a:spcBef>
               <a:spcAft>
                 <a:spcPts val="600"/>
               </a:spcAft>
-              <a:buClrTx/>
-              <a:buSzTx/>
-              <a:buFontTx/>
-              <a:buNone/>
-              <a:tabLst/>
-              <a:defRPr/>
             </a:pPr>
             <a:r>
-              <a:rPr kumimoji="0" lang="en-US" sz="2400" b="1" i="0" u="sng" strike="noStrike" kern="1200" cap="none" spc="0" normalizeH="0" baseline="0" noProof="0" dirty="0">
-                <a:ln>
-                  <a:noFill/>
-                </a:ln>
+              <a:rPr lang="en-US" sz="2400" dirty="0">
                 <a:solidFill>
-                  <a:prstClr val="white"/>
+                  <a:schemeClr val="bg1"/>
                 </a:solidFill>
-                <a:effectLst>
-                  <a:outerShdw blurRad="38100" dist="38100" dir="2700000" algn="tl">
-                    <a:srgbClr val="000000">
-                      <a:alpha val="43137"/>
-                    </a:srgbClr>
-                  </a:outerShdw>
-                </a:effectLst>
-                <a:uLnTx/>
-                <a:uFillTx/>
                 <a:latin typeface="Arial" panose="020B0604020202020204" pitchFamily="34" charset="0"/>
-                <a:ea typeface="+mn-ea"/>
                 <a:cs typeface="Arial" panose="020B0604020202020204" pitchFamily="34" charset="0"/>
               </a:rPr>
-              <a:t>Drought Conditions</a:t>
-            </a:r>
-          </a:p>
-          <a:p>
-            <a:pPr marL="0" marR="0" lvl="0" indent="0" algn="l" defTabSz="914400" rtl="0" eaLnBrk="1" fontAlgn="auto" latinLnBrk="0" hangingPunct="1">
+              <a:t>Humidity and Precipitation</a:t>
+            </a:r>
+          </a:p>
+          <a:p>
+            <a:pPr>
               <a:lnSpc>
                 <a:spcPct val="90000"/>
               </a:lnSpc>
-              <a:spcBef>
-                <a:spcPts val="0"/>
-              </a:spcBef>
               <a:spcAft>
                 <a:spcPts val="600"/>
               </a:spcAft>
-              <a:buClrTx/>
-              <a:buSzTx/>
-              <a:buFontTx/>
-              <a:buNone/>
-              <a:tabLst/>
-              <a:defRPr/>
             </a:pPr>
-            <a:endParaRPr kumimoji="0" lang="en-US" sz="2400" b="1" i="0" u="sng" strike="noStrike" kern="1200" cap="none" spc="0" normalizeH="0" baseline="0" noProof="0" dirty="0">
-              <a:ln>
-                <a:noFill/>
-              </a:ln>
-              <a:solidFill>
-                <a:prstClr val="white"/>
-              </a:solidFill>
-              <a:effectLst>
-                <a:outerShdw blurRad="38100" dist="38100" dir="2700000" algn="tl">
-                  <a:srgbClr val="000000">
-                    <a:alpha val="43137"/>
-                  </a:srgbClr>
-                </a:outerShdw>
-              </a:effectLst>
-              <a:uLnTx/>
-              <a:uFillTx/>
-              <a:latin typeface="Arial" panose="020B0604020202020204" pitchFamily="34" charset="0"/>
-              <a:ea typeface="+mn-ea"/>
-              <a:cs typeface="Arial" panose="020B0604020202020204" pitchFamily="34" charset="0"/>
-            </a:endParaRPr>
-          </a:p>
-          <a:p>
-            <a:pPr marL="342900" marR="0" lvl="0" indent="-342900" algn="l" defTabSz="914400" rtl="0" eaLnBrk="1" fontAlgn="auto" latinLnBrk="0" hangingPunct="1">
+            <a:r>
+              <a:rPr lang="en-US" sz="2400" dirty="0">
+                <a:solidFill>
+                  <a:schemeClr val="bg1"/>
+                </a:solidFill>
+                <a:latin typeface="Arial" panose="020B0604020202020204" pitchFamily="34" charset="0"/>
+                <a:cs typeface="Arial" panose="020B0604020202020204" pitchFamily="34" charset="0"/>
+              </a:rPr>
+              <a:t>Change in Water Level by year (J17)</a:t>
+            </a:r>
+          </a:p>
+          <a:p>
+            <a:pPr>
               <a:lnSpc>
                 <a:spcPct val="90000"/>
               </a:lnSpc>
-              <a:spcBef>
-                <a:spcPts val="0"/>
-              </a:spcBef>
               <a:spcAft>
                 <a:spcPts val="600"/>
               </a:spcAft>
-              <a:buClrTx/>
-              <a:buSzTx/>
-              <a:buFont typeface="Arial" panose="020B0604020202020204" pitchFamily="34" charset="0"/>
-              <a:buChar char="•"/>
-              <a:tabLst/>
-              <a:defRPr/>
             </a:pPr>
-            <a:endParaRPr kumimoji="0" lang="en-US" sz="2400" b="1" i="0" u="sng" strike="noStrike" kern="1200" cap="none" spc="0" normalizeH="0" baseline="0" noProof="0" dirty="0">
-              <a:ln>
-                <a:noFill/>
-              </a:ln>
-              <a:solidFill>
-                <a:prstClr val="white"/>
-              </a:solidFill>
-              <a:effectLst>
-                <a:outerShdw blurRad="38100" dist="38100" dir="2700000" algn="tl">
-                  <a:srgbClr val="000000">
-                    <a:alpha val="43137"/>
-                  </a:srgbClr>
-                </a:outerShdw>
-              </a:effectLst>
-              <a:uLnTx/>
-              <a:uFillTx/>
-              <a:latin typeface="Arial" panose="020B0604020202020204" pitchFamily="34" charset="0"/>
-              <a:ea typeface="+mn-ea"/>
-              <a:cs typeface="Arial" panose="020B0604020202020204" pitchFamily="34" charset="0"/>
-            </a:endParaRPr>
-          </a:p>
-          <a:p>
-            <a:pPr marL="342900" marR="0" lvl="0" indent="-342900" algn="l" defTabSz="914400" rtl="0" eaLnBrk="1" fontAlgn="auto" latinLnBrk="0" hangingPunct="1">
-              <a:lnSpc>
-                <a:spcPct val="90000"/>
-              </a:lnSpc>
-              <a:spcBef>
-                <a:spcPts val="0"/>
-              </a:spcBef>
-              <a:spcAft>
-                <a:spcPts val="600"/>
-              </a:spcAft>
-              <a:buClrTx/>
-              <a:buSzTx/>
-              <a:buFont typeface="Wingdings" panose="05000000000000000000" pitchFamily="2" charset="2"/>
-              <a:buChar char="Ø"/>
-              <a:tabLst/>
-              <a:defRPr/>
-            </a:pPr>
-            <a:endParaRPr kumimoji="0" lang="en-US" sz="2400" b="1" i="0" u="sng" strike="noStrike" kern="1200" cap="none" spc="0" normalizeH="0" baseline="0" noProof="0" dirty="0">
-              <a:ln>
-                <a:noFill/>
-              </a:ln>
-              <a:solidFill>
-                <a:prstClr val="white"/>
-              </a:solidFill>
-              <a:effectLst>
-                <a:outerShdw blurRad="38100" dist="38100" dir="2700000" algn="tl">
-                  <a:srgbClr val="000000">
-                    <a:alpha val="43137"/>
-                  </a:srgbClr>
-                </a:outerShdw>
-              </a:effectLst>
-              <a:uLnTx/>
-              <a:uFillTx/>
-              <a:latin typeface="Arial" panose="020B0604020202020204" pitchFamily="34" charset="0"/>
-              <a:ea typeface="+mn-ea"/>
-              <a:cs typeface="Arial" panose="020B0604020202020204" pitchFamily="34" charset="0"/>
-            </a:endParaRPr>
-          </a:p>
-          <a:p>
-            <a:pPr marL="0" marR="0" lvl="0" indent="0" algn="l" defTabSz="914400" rtl="0" eaLnBrk="1" fontAlgn="auto" latinLnBrk="0" hangingPunct="1">
-              <a:lnSpc>
-                <a:spcPct val="90000"/>
-              </a:lnSpc>
-              <a:spcBef>
-                <a:spcPts val="0"/>
-              </a:spcBef>
-              <a:spcAft>
-                <a:spcPts val="600"/>
-              </a:spcAft>
-              <a:buClrTx/>
-              <a:buSzTx/>
-              <a:buFontTx/>
-              <a:buNone/>
-              <a:tabLst/>
-              <a:defRPr/>
-            </a:pPr>
-            <a:endParaRPr kumimoji="0" lang="en-US" sz="2400" b="0" i="0" u="none" strike="noStrike" kern="1200" cap="none" spc="0" normalizeH="0" baseline="0" noProof="0" dirty="0">
-              <a:ln>
-                <a:noFill/>
-              </a:ln>
-              <a:solidFill>
-                <a:prstClr val="white"/>
-              </a:solidFill>
-              <a:effectLst/>
-              <a:uLnTx/>
-              <a:uFillTx/>
-              <a:latin typeface="Arial" panose="020B0604020202020204" pitchFamily="34" charset="0"/>
-              <a:ea typeface="+mn-ea"/>
-              <a:cs typeface="Arial" panose="020B0604020202020204" pitchFamily="34" charset="0"/>
-            </a:endParaRPr>
+            <a:r>
+              <a:rPr lang="en-US" sz="2400" dirty="0">
+                <a:solidFill>
+                  <a:schemeClr val="bg1"/>
+                </a:solidFill>
+                <a:latin typeface="Arial" panose="020B0604020202020204" pitchFamily="34" charset="0"/>
+                <a:cs typeface="Arial" panose="020B0604020202020204" pitchFamily="34" charset="0"/>
+              </a:rPr>
+              <a:t>Drought Levels for water restriction (Stage 1, Stage 2, Stage 3)</a:t>
+            </a:r>
           </a:p>
         </p:txBody>
       </p:sp>
@@ -6850,7 +7008,7 @@
         </p:nvSpPr>
         <p:spPr>
           <a:xfrm>
-            <a:off x="838200" y="161458"/>
+            <a:off x="838200" y="2870489"/>
             <a:ext cx="10515600" cy="558511"/>
           </a:xfrm>
         </p:spPr>
@@ -6867,15 +7025,87 @@
                   <a:schemeClr val="bg1"/>
                 </a:solidFill>
               </a:rPr>
-              <a:t>Changes in Water level</a:t>
-            </a:r>
+              <a:t>State “Based on the null hypothesis its not…”</a:t>
+            </a:r>
+            <a:br>
+              <a:rPr lang="en-US" dirty="0">
+                <a:solidFill>
+                  <a:schemeClr val="bg1"/>
+                </a:solidFill>
+              </a:rPr>
+            </a:br>
+            <a:br>
+              <a:rPr lang="en-US" dirty="0">
+                <a:solidFill>
+                  <a:schemeClr val="bg1"/>
+                </a:solidFill>
+              </a:rPr>
+            </a:br>
+            <a:r>
+              <a:rPr lang="en-US" dirty="0">
+                <a:solidFill>
+                  <a:schemeClr val="bg1"/>
+                </a:solidFill>
+              </a:rPr>
+              <a:t>We see Temperature had a standard seasonal pattern</a:t>
+            </a:r>
+            <a:br>
+              <a:rPr lang="en-US" dirty="0">
+                <a:solidFill>
+                  <a:schemeClr val="bg1"/>
+                </a:solidFill>
+              </a:rPr>
+            </a:br>
+            <a:br>
+              <a:rPr lang="en-US" dirty="0">
+                <a:solidFill>
+                  <a:schemeClr val="bg1"/>
+                </a:solidFill>
+              </a:rPr>
+            </a:br>
+            <a:r>
+              <a:rPr lang="en-US" dirty="0">
+                <a:solidFill>
+                  <a:schemeClr val="bg1"/>
+                </a:solidFill>
+              </a:rPr>
+              <a:t>(add plots from .</a:t>
+            </a:r>
+            <a:r>
+              <a:rPr lang="en-US" dirty="0" err="1">
+                <a:solidFill>
+                  <a:schemeClr val="bg1"/>
+                </a:solidFill>
+              </a:rPr>
+              <a:t>ipynb</a:t>
+            </a:r>
+            <a:r>
+              <a:rPr lang="en-US" dirty="0">
+                <a:solidFill>
+                  <a:schemeClr val="bg1"/>
+                </a:solidFill>
+              </a:rPr>
+              <a:t>)</a:t>
+            </a:r>
+            <a:br>
+              <a:rPr lang="en-US" dirty="0">
+                <a:solidFill>
+                  <a:schemeClr val="bg1"/>
+                </a:solidFill>
+              </a:rPr>
+            </a:br>
+            <a:endParaRPr lang="en-US" dirty="0">
+              <a:solidFill>
+                <a:schemeClr val="bg1"/>
+              </a:solidFill>
+            </a:endParaRPr>
           </a:p>
         </p:txBody>
       </p:sp>
     </p:spTree>
     <p:extLst>
       <p:ext uri="{BB962C8B-B14F-4D97-AF65-F5344CB8AC3E}">
-        <p14:creationId xmlns:p14="http://schemas.microsoft.com/office/powerpoint/2010/main" val="3901033085"/>
+        <p14:creationId xmlns:p14="http://schemas.microsoft.com/office/powerpoint/2010/main" val="484720391"/>
       </p:ext>
     </p:extLst>
   </p:cSld>
@@ -6956,7 +7186,7 @@
                   <a:schemeClr val="bg1"/>
                 </a:solidFill>
               </a:rPr>
-              <a:t>Temperature</a:t>
+              <a:t>Humidity and Precipitation</a:t>
             </a:r>
           </a:p>
         </p:txBody>
@@ -6964,7 +7194,7 @@
     </p:spTree>
     <p:extLst>
       <p:ext uri="{BB962C8B-B14F-4D97-AF65-F5344CB8AC3E}">
-        <p14:creationId xmlns:p14="http://schemas.microsoft.com/office/powerpoint/2010/main" val="480479742"/>
+        <p14:creationId xmlns:p14="http://schemas.microsoft.com/office/powerpoint/2010/main" val="1740637987"/>
       </p:ext>
     </p:extLst>
   </p:cSld>
@@ -7045,7 +7275,42 @@
                   <a:schemeClr val="bg1"/>
                 </a:solidFill>
               </a:rPr>
-              <a:t>Humidity and Precipitation</a:t>
+              <a:t>Water level restrictions</a:t>
+            </a:r>
+          </a:p>
+        </p:txBody>
+      </p:sp>
+      <p:sp>
+        <p:nvSpPr>
+          <p:cNvPr id="3" name="TextBox 2">
+            <a:extLst>
+              <a:ext uri="{FF2B5EF4-FFF2-40B4-BE49-F238E27FC236}">
+                <a16:creationId xmlns:a16="http://schemas.microsoft.com/office/drawing/2014/main" id="{56D57CE9-A69E-4C5C-875F-D635DB6B0614}"/>
+              </a:ext>
+            </a:extLst>
+          </p:cNvPr>
+          <p:cNvSpPr txBox="1"/>
+          <p:nvPr/>
+        </p:nvSpPr>
+        <p:spPr>
+          <a:xfrm>
+            <a:off x="838200" y="992038"/>
+            <a:ext cx="10712570" cy="369332"/>
+          </a:xfrm>
+          <a:prstGeom prst="rect">
+            <a:avLst/>
+          </a:prstGeom>
+          <a:noFill/>
+        </p:spPr>
+        <p:txBody>
+          <a:bodyPr wrap="square" rtlCol="0">
+            <a:spAutoFit/>
+          </a:bodyPr>
+          <a:lstStyle/>
+          <a:p>
+            <a:r>
+              <a:rPr lang="en-US" dirty="0"/>
+              <a:t>Plots/charts explaining Time vs water levels at each point (5 years) </a:t>
             </a:r>
           </a:p>
         </p:txBody>
@@ -7053,7 +7318,7 @@
     </p:spTree>
     <p:extLst>
       <p:ext uri="{BB962C8B-B14F-4D97-AF65-F5344CB8AC3E}">
-        <p14:creationId xmlns:p14="http://schemas.microsoft.com/office/powerpoint/2010/main" val="1740637987"/>
+        <p14:creationId xmlns:p14="http://schemas.microsoft.com/office/powerpoint/2010/main" val="3984128667"/>
       </p:ext>
     </p:extLst>
   </p:cSld>

</xml_diff>